<commit_message>
Refactor to new note representation
</commit_message>
<xml_diff>
--- a/doc/节奏练习工具.pptx
+++ b/doc/节奏练习工具.pptx
@@ -7,14 +7,15 @@
   <p:sldIdLst>
     <p:sldId id="257" r:id="rId2"/>
     <p:sldId id="256" r:id="rId3"/>
-    <p:sldId id="258" r:id="rId4"/>
-    <p:sldId id="259" r:id="rId5"/>
-    <p:sldId id="260" r:id="rId6"/>
-    <p:sldId id="261" r:id="rId7"/>
-    <p:sldId id="262" r:id="rId8"/>
-    <p:sldId id="263" r:id="rId9"/>
-    <p:sldId id="264" r:id="rId10"/>
-    <p:sldId id="265" r:id="rId11"/>
+    <p:sldId id="266" r:id="rId4"/>
+    <p:sldId id="258" r:id="rId5"/>
+    <p:sldId id="259" r:id="rId6"/>
+    <p:sldId id="260" r:id="rId7"/>
+    <p:sldId id="261" r:id="rId8"/>
+    <p:sldId id="262" r:id="rId9"/>
+    <p:sldId id="263" r:id="rId10"/>
+    <p:sldId id="264" r:id="rId11"/>
+    <p:sldId id="265" r:id="rId12"/>
   </p:sldIdLst>
   <p:sldSz cx="12192000" cy="6858000"/>
   <p:notesSz cx="6858000" cy="9144000"/>
@@ -113,6 +114,11 @@
       </a:defRPr>
     </a:lvl9pPr>
   </p:defaultTextStyle>
+  <p:extLst>
+    <p:ext uri="{EFAFB233-063F-42B5-8137-9DF3F51BA10A}">
+      <p15:sldGuideLst xmlns:p15="http://schemas.microsoft.com/office/powerpoint/2012/main"/>
+    </p:ext>
+  </p:extLst>
 </p:presentation>
 </file>
 
@@ -265,7 +271,7 @@
           <a:p>
             <a:fld id="{2A90752C-7726-467B-A5EC-DEAA826312FA}" type="datetimeFigureOut">
               <a:rPr lang="zh-CN" altLang="en-US" smtClean="0"/>
-              <a:t>2018/10/13</a:t>
+              <a:t>2018/10/14</a:t>
             </a:fld>
             <a:endParaRPr lang="zh-CN" altLang="en-US"/>
           </a:p>
@@ -465,7 +471,7 @@
           <a:p>
             <a:fld id="{2A90752C-7726-467B-A5EC-DEAA826312FA}" type="datetimeFigureOut">
               <a:rPr lang="zh-CN" altLang="en-US" smtClean="0"/>
-              <a:t>2018/10/13</a:t>
+              <a:t>2018/10/14</a:t>
             </a:fld>
             <a:endParaRPr lang="zh-CN" altLang="en-US"/>
           </a:p>
@@ -675,7 +681,7 @@
           <a:p>
             <a:fld id="{2A90752C-7726-467B-A5EC-DEAA826312FA}" type="datetimeFigureOut">
               <a:rPr lang="zh-CN" altLang="en-US" smtClean="0"/>
-              <a:t>2018/10/13</a:t>
+              <a:t>2018/10/14</a:t>
             </a:fld>
             <a:endParaRPr lang="zh-CN" altLang="en-US"/>
           </a:p>
@@ -875,7 +881,7 @@
           <a:p>
             <a:fld id="{2A90752C-7726-467B-A5EC-DEAA826312FA}" type="datetimeFigureOut">
               <a:rPr lang="zh-CN" altLang="en-US" smtClean="0"/>
-              <a:t>2018/10/13</a:t>
+              <a:t>2018/10/14</a:t>
             </a:fld>
             <a:endParaRPr lang="zh-CN" altLang="en-US"/>
           </a:p>
@@ -1151,7 +1157,7 @@
           <a:p>
             <a:fld id="{2A90752C-7726-467B-A5EC-DEAA826312FA}" type="datetimeFigureOut">
               <a:rPr lang="zh-CN" altLang="en-US" smtClean="0"/>
-              <a:t>2018/10/13</a:t>
+              <a:t>2018/10/14</a:t>
             </a:fld>
             <a:endParaRPr lang="zh-CN" altLang="en-US"/>
           </a:p>
@@ -1419,7 +1425,7 @@
           <a:p>
             <a:fld id="{2A90752C-7726-467B-A5EC-DEAA826312FA}" type="datetimeFigureOut">
               <a:rPr lang="zh-CN" altLang="en-US" smtClean="0"/>
-              <a:t>2018/10/13</a:t>
+              <a:t>2018/10/14</a:t>
             </a:fld>
             <a:endParaRPr lang="zh-CN" altLang="en-US"/>
           </a:p>
@@ -1834,7 +1840,7 @@
           <a:p>
             <a:fld id="{2A90752C-7726-467B-A5EC-DEAA826312FA}" type="datetimeFigureOut">
               <a:rPr lang="zh-CN" altLang="en-US" smtClean="0"/>
-              <a:t>2018/10/13</a:t>
+              <a:t>2018/10/14</a:t>
             </a:fld>
             <a:endParaRPr lang="zh-CN" altLang="en-US"/>
           </a:p>
@@ -1976,7 +1982,7 @@
           <a:p>
             <a:fld id="{2A90752C-7726-467B-A5EC-DEAA826312FA}" type="datetimeFigureOut">
               <a:rPr lang="zh-CN" altLang="en-US" smtClean="0"/>
-              <a:t>2018/10/13</a:t>
+              <a:t>2018/10/14</a:t>
             </a:fld>
             <a:endParaRPr lang="zh-CN" altLang="en-US"/>
           </a:p>
@@ -2089,7 +2095,7 @@
           <a:p>
             <a:fld id="{2A90752C-7726-467B-A5EC-DEAA826312FA}" type="datetimeFigureOut">
               <a:rPr lang="zh-CN" altLang="en-US" smtClean="0"/>
-              <a:t>2018/10/13</a:t>
+              <a:t>2018/10/14</a:t>
             </a:fld>
             <a:endParaRPr lang="zh-CN" altLang="en-US"/>
           </a:p>
@@ -2402,7 +2408,7 @@
           <a:p>
             <a:fld id="{2A90752C-7726-467B-A5EC-DEAA826312FA}" type="datetimeFigureOut">
               <a:rPr lang="zh-CN" altLang="en-US" smtClean="0"/>
-              <a:t>2018/10/13</a:t>
+              <a:t>2018/10/14</a:t>
             </a:fld>
             <a:endParaRPr lang="zh-CN" altLang="en-US"/>
           </a:p>
@@ -2691,7 +2697,7 @@
           <a:p>
             <a:fld id="{2A90752C-7726-467B-A5EC-DEAA826312FA}" type="datetimeFigureOut">
               <a:rPr lang="zh-CN" altLang="en-US" smtClean="0"/>
-              <a:t>2018/10/13</a:t>
+              <a:t>2018/10/14</a:t>
             </a:fld>
             <a:endParaRPr lang="zh-CN" altLang="en-US"/>
           </a:p>
@@ -2934,7 +2940,7 @@
           <a:p>
             <a:fld id="{2A90752C-7726-467B-A5EC-DEAA826312FA}" type="datetimeFigureOut">
               <a:rPr lang="zh-CN" altLang="en-US" smtClean="0"/>
-              <a:t>2018/10/13</a:t>
+              <a:t>2018/10/14</a:t>
             </a:fld>
             <a:endParaRPr lang="zh-CN" altLang="en-US"/>
           </a:p>
@@ -3496,6 +3502,94 @@
           <p:cNvPr id="2" name="Title 1">
             <a:extLst>
               <a:ext uri="{FF2B5EF4-FFF2-40B4-BE49-F238E27FC236}">
+                <a16:creationId xmlns:a16="http://schemas.microsoft.com/office/drawing/2014/main" id="{123E8ECC-49D8-4A59-BAD3-E62BE4490B26}"/>
+              </a:ext>
+            </a:extLst>
+          </p:cNvPr>
+          <p:cNvSpPr>
+            <a:spLocks noGrp="1"/>
+          </p:cNvSpPr>
+          <p:nvPr>
+            <p:ph type="title"/>
+          </p:nvPr>
+        </p:nvSpPr>
+        <p:spPr/>
+        <p:txBody>
+          <a:bodyPr/>
+          <a:lstStyle/>
+          <a:p>
+            <a:r>
+              <a:rPr lang="zh-CN" altLang="en-US" dirty="0"/>
+              <a:t>上面的基础上，加入三连音休止</a:t>
+            </a:r>
+          </a:p>
+        </p:txBody>
+      </p:sp>
+      <p:pic>
+        <p:nvPicPr>
+          <p:cNvPr id="3" name="Picture 2">
+            <a:extLst>
+              <a:ext uri="{FF2B5EF4-FFF2-40B4-BE49-F238E27FC236}">
+                <a16:creationId xmlns:a16="http://schemas.microsoft.com/office/drawing/2014/main" id="{EF6762B1-1DB4-42CC-8AF5-4A9B3CBBFE7D}"/>
+              </a:ext>
+            </a:extLst>
+          </p:cNvPr>
+          <p:cNvPicPr>
+            <a:picLocks noChangeAspect="1"/>
+          </p:cNvPicPr>
+          <p:nvPr/>
+        </p:nvPicPr>
+        <p:blipFill>
+          <a:blip r:embed="rId2"/>
+          <a:stretch>
+            <a:fillRect/>
+          </a:stretch>
+        </p:blipFill>
+        <p:spPr>
+          <a:xfrm>
+            <a:off x="3129153" y="1769533"/>
+            <a:ext cx="8424672" cy="4712229"/>
+          </a:xfrm>
+          <a:prstGeom prst="rect">
+            <a:avLst/>
+          </a:prstGeom>
+        </p:spPr>
+      </p:pic>
+    </p:spTree>
+    <p:extLst>
+      <p:ext uri="{BB962C8B-B14F-4D97-AF65-F5344CB8AC3E}">
+        <p14:creationId xmlns:p14="http://schemas.microsoft.com/office/powerpoint/2010/main" val="1997386298"/>
+      </p:ext>
+    </p:extLst>
+  </p:cSld>
+  <p:clrMapOvr>
+    <a:masterClrMapping/>
+  </p:clrMapOvr>
+</p:sld>
+</file>
+
+<file path=ppt/slides/slide11.xml><?xml version="1.0" encoding="utf-8"?>
+<p:sld xmlns:a="http://schemas.openxmlformats.org/drawingml/2006/main" xmlns:r="http://schemas.openxmlformats.org/officeDocument/2006/relationships" xmlns:p="http://schemas.openxmlformats.org/presentationml/2006/main">
+  <p:cSld>
+    <p:spTree>
+      <p:nvGrpSpPr>
+        <p:cNvPr id="1" name=""/>
+        <p:cNvGrpSpPr/>
+        <p:nvPr/>
+      </p:nvGrpSpPr>
+      <p:grpSpPr>
+        <a:xfrm>
+          <a:off x="0" y="0"/>
+          <a:ext cx="0" cy="0"/>
+          <a:chOff x="0" y="0"/>
+          <a:chExt cx="0" cy="0"/>
+        </a:xfrm>
+      </p:grpSpPr>
+      <p:sp>
+        <p:nvSpPr>
+          <p:cNvPr id="2" name="Title 1">
+            <a:extLst>
+              <a:ext uri="{FF2B5EF4-FFF2-40B4-BE49-F238E27FC236}">
                 <a16:creationId xmlns:a16="http://schemas.microsoft.com/office/drawing/2014/main" id="{D8F393E9-7B60-4EA8-BCFD-7DC7D61233F8}"/>
               </a:ext>
             </a:extLst>
@@ -4264,7 +4358,7 @@
           <p:cNvPr id="2" name="Title 1">
             <a:extLst>
               <a:ext uri="{FF2B5EF4-FFF2-40B4-BE49-F238E27FC236}">
-                <a16:creationId xmlns:a16="http://schemas.microsoft.com/office/drawing/2014/main" id="{78C28B33-F57D-4BDA-9D1D-274BBD14F3EC}"/>
+                <a16:creationId xmlns:a16="http://schemas.microsoft.com/office/drawing/2014/main" id="{7B7820BD-0B6D-49B2-9124-5264463B20F4}"/>
               </a:ext>
             </a:extLst>
           </p:cNvPr>
@@ -4282,1049 +4376,74 @@
           <a:p>
             <a:r>
               <a:rPr lang="zh-CN" altLang="en-US" dirty="0"/>
-              <a:t>节拍器控制</a:t>
-            </a:r>
-          </a:p>
-        </p:txBody>
-      </p:sp>
-      <p:pic>
-        <p:nvPicPr>
-          <p:cNvPr id="3" name="Picture 2">
-            <a:extLst>
-              <a:ext uri="{FF2B5EF4-FFF2-40B4-BE49-F238E27FC236}">
-                <a16:creationId xmlns:a16="http://schemas.microsoft.com/office/drawing/2014/main" id="{20241DD7-1EA0-4F58-AE61-5D099DA76A84}"/>
-              </a:ext>
-            </a:extLst>
-          </p:cNvPr>
-          <p:cNvPicPr/>
-          <p:nvPr/>
-        </p:nvPicPr>
-        <p:blipFill>
-          <a:blip r:embed="rId2"/>
-          <a:stretch>
-            <a:fillRect/>
-          </a:stretch>
-        </p:blipFill>
-        <p:spPr>
-          <a:xfrm>
-            <a:off x="904066" y="1467630"/>
-            <a:ext cx="10495669" cy="909810"/>
-          </a:xfrm>
-          <a:prstGeom prst="rect">
-            <a:avLst/>
-          </a:prstGeom>
-        </p:spPr>
-      </p:pic>
-      <p:cxnSp>
-        <p:nvCxnSpPr>
-          <p:cNvPr id="4" name="Straight Arrow Connector 3">
-            <a:extLst>
-              <a:ext uri="{FF2B5EF4-FFF2-40B4-BE49-F238E27FC236}">
-                <a16:creationId xmlns:a16="http://schemas.microsoft.com/office/drawing/2014/main" id="{CEEB00A5-61F3-44DA-AF7A-A519DB1C28D9}"/>
-              </a:ext>
-            </a:extLst>
-          </p:cNvPr>
-          <p:cNvCxnSpPr>
-            <a:cxnSpLocks/>
-          </p:cNvCxnSpPr>
-          <p:nvPr/>
-        </p:nvCxnSpPr>
-        <p:spPr>
-          <a:xfrm flipH="1" flipV="1">
-            <a:off x="1502492" y="2377440"/>
-            <a:ext cx="26075" cy="3252919"/>
-          </a:xfrm>
-          <a:prstGeom prst="straightConnector1">
-            <a:avLst/>
-          </a:prstGeom>
-          <a:ln w="28575">
-            <a:tailEnd type="triangle"/>
-          </a:ln>
-        </p:spPr>
-        <p:style>
-          <a:lnRef idx="1">
-            <a:schemeClr val="accent1"/>
-          </a:lnRef>
-          <a:fillRef idx="0">
-            <a:schemeClr val="accent1"/>
-          </a:fillRef>
-          <a:effectRef idx="0">
-            <a:schemeClr val="accent1"/>
-          </a:effectRef>
-          <a:fontRef idx="minor">
-            <a:schemeClr val="tx1"/>
-          </a:fontRef>
-        </p:style>
-      </p:cxnSp>
-      <p:sp>
-        <p:nvSpPr>
-          <p:cNvPr id="5" name="Text Box 11">
-            <a:extLst>
-              <a:ext uri="{FF2B5EF4-FFF2-40B4-BE49-F238E27FC236}">
-                <a16:creationId xmlns:a16="http://schemas.microsoft.com/office/drawing/2014/main" id="{00D69AC1-B50A-4466-96A4-B930ACEC4080}"/>
-              </a:ext>
-            </a:extLst>
-          </p:cNvPr>
-          <p:cNvSpPr txBox="1"/>
-          <p:nvPr/>
-        </p:nvSpPr>
-        <p:spPr>
-          <a:xfrm>
-            <a:off x="1481571" y="5083882"/>
-            <a:ext cx="3217891" cy="612976"/>
-          </a:xfrm>
-          <a:prstGeom prst="rect">
-            <a:avLst/>
-          </a:prstGeom>
-          <a:noFill/>
-          <a:ln w="6350">
-            <a:noFill/>
-          </a:ln>
-        </p:spPr>
-        <p:txBody>
-          <a:bodyPr rot="0" spcFirstLastPara="0" vert="horz" wrap="square" lIns="91440" tIns="45720" rIns="91440" bIns="45720" numCol="1" spcCol="0" rtlCol="0" fromWordArt="0" anchor="t" anchorCtr="0" forceAA="0" compatLnSpc="1">
-            <a:prstTxWarp prst="textNoShape">
-              <a:avLst/>
-            </a:prstTxWarp>
-            <a:noAutofit/>
-          </a:bodyPr>
-          <a:lstStyle/>
-          <a:p>
-            <a:pPr algn="just">
-              <a:spcAft>
-                <a:spcPts val="0"/>
-              </a:spcAft>
-            </a:pPr>
-            <a:r>
-              <a:rPr lang="zh-CN" sz="1400" kern="100" dirty="0">
-                <a:effectLst/>
-                <a:latin typeface="等线" panose="02010600030101010101" pitchFamily="2" charset="-122"/>
-                <a:ea typeface="等线" panose="02010600030101010101" pitchFamily="2" charset="-122"/>
-                <a:cs typeface="Times New Roman" panose="02020603050405020304" pitchFamily="18" charset="0"/>
-              </a:rPr>
-              <a:t>小节重复次数，</a:t>
-            </a:r>
-            <a:r>
-              <a:rPr lang="en-US" sz="1400" b="1" kern="100" dirty="0">
-                <a:effectLst/>
-                <a:latin typeface="等线" panose="02010600030101010101" pitchFamily="2" charset="-122"/>
-                <a:ea typeface="等线" panose="02010600030101010101" pitchFamily="2" charset="-122"/>
-                <a:cs typeface="Times New Roman" panose="02020603050405020304" pitchFamily="18" charset="0"/>
-              </a:rPr>
-              <a:t>4bars</a:t>
-            </a:r>
-            <a:r>
-              <a:rPr lang="zh-CN" sz="1400" kern="100" dirty="0">
-                <a:effectLst/>
-                <a:latin typeface="等线" panose="02010600030101010101" pitchFamily="2" charset="-122"/>
-                <a:ea typeface="等线" panose="02010600030101010101" pitchFamily="2" charset="-122"/>
-                <a:cs typeface="Times New Roman" panose="02020603050405020304" pitchFamily="18" charset="0"/>
-              </a:rPr>
-              <a:t>就是每条重复四次然后自动进入下一条</a:t>
-            </a:r>
-          </a:p>
-        </p:txBody>
-      </p:sp>
-      <p:cxnSp>
-        <p:nvCxnSpPr>
-          <p:cNvPr id="12" name="Straight Connector 11">
-            <a:extLst>
-              <a:ext uri="{FF2B5EF4-FFF2-40B4-BE49-F238E27FC236}">
-                <a16:creationId xmlns:a16="http://schemas.microsoft.com/office/drawing/2014/main" id="{10D4F022-2AD3-4988-BB40-3CD446609122}"/>
-              </a:ext>
-            </a:extLst>
-          </p:cNvPr>
-          <p:cNvCxnSpPr>
-            <a:cxnSpLocks/>
-          </p:cNvCxnSpPr>
-          <p:nvPr/>
-        </p:nvCxnSpPr>
-        <p:spPr>
-          <a:xfrm>
-            <a:off x="1516305" y="5630357"/>
-            <a:ext cx="3127739" cy="0"/>
-          </a:xfrm>
-          <a:prstGeom prst="line">
-            <a:avLst/>
-          </a:prstGeom>
-          <a:ln w="28575">
-            <a:headEnd type="none" w="med" len="med"/>
-            <a:tailEnd type="none" w="med" len="med"/>
-          </a:ln>
-        </p:spPr>
-        <p:style>
-          <a:lnRef idx="1">
-            <a:schemeClr val="accent1"/>
-          </a:lnRef>
-          <a:fillRef idx="0">
-            <a:schemeClr val="accent1"/>
-          </a:fillRef>
-          <a:effectRef idx="0">
-            <a:schemeClr val="accent1"/>
-          </a:effectRef>
-          <a:fontRef idx="minor">
-            <a:schemeClr val="tx1"/>
-          </a:fontRef>
-        </p:style>
-      </p:cxnSp>
-      <p:cxnSp>
-        <p:nvCxnSpPr>
-          <p:cNvPr id="17" name="Straight Arrow Connector 16">
-            <a:extLst>
-              <a:ext uri="{FF2B5EF4-FFF2-40B4-BE49-F238E27FC236}">
-                <a16:creationId xmlns:a16="http://schemas.microsoft.com/office/drawing/2014/main" id="{77828EA2-6A3B-4A5B-A2FB-65FD0AE53036}"/>
-              </a:ext>
-            </a:extLst>
-          </p:cNvPr>
-          <p:cNvCxnSpPr>
-            <a:cxnSpLocks/>
-          </p:cNvCxnSpPr>
-          <p:nvPr/>
-        </p:nvCxnSpPr>
-        <p:spPr>
-          <a:xfrm flipH="1" flipV="1">
-            <a:off x="3162492" y="2427316"/>
-            <a:ext cx="17537" cy="2187634"/>
-          </a:xfrm>
-          <a:prstGeom prst="straightConnector1">
-            <a:avLst/>
-          </a:prstGeom>
-          <a:ln w="28575">
-            <a:tailEnd type="triangle"/>
-          </a:ln>
-        </p:spPr>
-        <p:style>
-          <a:lnRef idx="1">
-            <a:schemeClr val="accent1"/>
-          </a:lnRef>
-          <a:fillRef idx="0">
-            <a:schemeClr val="accent1"/>
-          </a:fillRef>
-          <a:effectRef idx="0">
-            <a:schemeClr val="accent1"/>
-          </a:effectRef>
-          <a:fontRef idx="minor">
-            <a:schemeClr val="tx1"/>
-          </a:fontRef>
-        </p:style>
-      </p:cxnSp>
-      <p:sp>
-        <p:nvSpPr>
-          <p:cNvPr id="18" name="Text Box 11">
-            <a:extLst>
-              <a:ext uri="{FF2B5EF4-FFF2-40B4-BE49-F238E27FC236}">
-                <a16:creationId xmlns:a16="http://schemas.microsoft.com/office/drawing/2014/main" id="{FD5D681D-5E36-4D8B-99D7-F93200631F92}"/>
-              </a:ext>
-            </a:extLst>
-          </p:cNvPr>
-          <p:cNvSpPr txBox="1"/>
-          <p:nvPr/>
-        </p:nvSpPr>
-        <p:spPr>
-          <a:xfrm>
-            <a:off x="3133032" y="4294908"/>
-            <a:ext cx="3217891" cy="386539"/>
-          </a:xfrm>
-          <a:prstGeom prst="rect">
-            <a:avLst/>
-          </a:prstGeom>
-          <a:noFill/>
-          <a:ln w="6350">
-            <a:noFill/>
-          </a:ln>
-        </p:spPr>
-        <p:txBody>
-          <a:bodyPr rot="0" spcFirstLastPara="0" vert="horz" wrap="square" lIns="91440" tIns="45720" rIns="91440" bIns="45720" numCol="1" spcCol="0" rtlCol="0" fromWordArt="0" anchor="t" anchorCtr="0" forceAA="0" compatLnSpc="1">
-            <a:prstTxWarp prst="textNoShape">
-              <a:avLst/>
-            </a:prstTxWarp>
-            <a:noAutofit/>
-          </a:bodyPr>
-          <a:lstStyle/>
-          <a:p>
-            <a:pPr algn="just">
-              <a:spcAft>
-                <a:spcPts val="0"/>
-              </a:spcAft>
-            </a:pPr>
-            <a:r>
-              <a:rPr lang="zh-CN" altLang="en-US" sz="1400" kern="100" dirty="0">
-                <a:latin typeface="等线" panose="02010600030101010101" pitchFamily="2" charset="-122"/>
-                <a:ea typeface="等线" panose="02010600030101010101" pitchFamily="2" charset="-122"/>
-                <a:cs typeface="Times New Roman" panose="02020603050405020304" pitchFamily="18" charset="0"/>
-              </a:rPr>
-              <a:t>速度，每档快</a:t>
-            </a:r>
-            <a:r>
-              <a:rPr lang="en-US" altLang="zh-CN" sz="1400" kern="100" dirty="0">
-                <a:latin typeface="等线" panose="02010600030101010101" pitchFamily="2" charset="-122"/>
-                <a:ea typeface="等线" panose="02010600030101010101" pitchFamily="2" charset="-122"/>
-                <a:cs typeface="Times New Roman" panose="02020603050405020304" pitchFamily="18" charset="0"/>
-              </a:rPr>
-              <a:t>10%</a:t>
-            </a:r>
-            <a:endParaRPr lang="zh-CN" sz="1400" kern="100" dirty="0">
-              <a:effectLst/>
-              <a:latin typeface="等线" panose="02010600030101010101" pitchFamily="2" charset="-122"/>
-              <a:ea typeface="等线" panose="02010600030101010101" pitchFamily="2" charset="-122"/>
-              <a:cs typeface="Times New Roman" panose="02020603050405020304" pitchFamily="18" charset="0"/>
-            </a:endParaRPr>
-          </a:p>
-        </p:txBody>
-      </p:sp>
-      <p:cxnSp>
-        <p:nvCxnSpPr>
-          <p:cNvPr id="19" name="Straight Connector 18">
-            <a:extLst>
-              <a:ext uri="{FF2B5EF4-FFF2-40B4-BE49-F238E27FC236}">
-                <a16:creationId xmlns:a16="http://schemas.microsoft.com/office/drawing/2014/main" id="{27C9A8E5-29F0-45EF-9000-636F5A290287}"/>
-              </a:ext>
-            </a:extLst>
-          </p:cNvPr>
-          <p:cNvCxnSpPr>
-            <a:cxnSpLocks/>
-          </p:cNvCxnSpPr>
-          <p:nvPr/>
-        </p:nvCxnSpPr>
-        <p:spPr>
-          <a:xfrm>
-            <a:off x="3167766" y="4614947"/>
-            <a:ext cx="3127739" cy="0"/>
-          </a:xfrm>
-          <a:prstGeom prst="line">
-            <a:avLst/>
-          </a:prstGeom>
-          <a:ln w="28575">
-            <a:headEnd type="none" w="med" len="med"/>
-            <a:tailEnd type="none" w="med" len="med"/>
-          </a:ln>
-        </p:spPr>
-        <p:style>
-          <a:lnRef idx="1">
-            <a:schemeClr val="accent1"/>
-          </a:lnRef>
-          <a:fillRef idx="0">
-            <a:schemeClr val="accent1"/>
-          </a:fillRef>
-          <a:effectRef idx="0">
-            <a:schemeClr val="accent1"/>
-          </a:effectRef>
-          <a:fontRef idx="minor">
-            <a:schemeClr val="tx1"/>
-          </a:fontRef>
-        </p:style>
-      </p:cxnSp>
-      <p:cxnSp>
-        <p:nvCxnSpPr>
-          <p:cNvPr id="22" name="Straight Arrow Connector 21">
-            <a:extLst>
-              <a:ext uri="{FF2B5EF4-FFF2-40B4-BE49-F238E27FC236}">
-                <a16:creationId xmlns:a16="http://schemas.microsoft.com/office/drawing/2014/main" id="{36978CF2-81ED-472F-B7C2-479FB3366586}"/>
-              </a:ext>
-            </a:extLst>
-          </p:cNvPr>
-          <p:cNvCxnSpPr>
-            <a:cxnSpLocks/>
-          </p:cNvCxnSpPr>
-          <p:nvPr/>
-        </p:nvCxnSpPr>
-        <p:spPr>
-          <a:xfrm flipH="1" flipV="1">
-            <a:off x="4352133" y="2377440"/>
-            <a:ext cx="13846" cy="1727037"/>
-          </a:xfrm>
-          <a:prstGeom prst="straightConnector1">
-            <a:avLst/>
-          </a:prstGeom>
-          <a:ln w="28575">
-            <a:tailEnd type="triangle"/>
-          </a:ln>
-        </p:spPr>
-        <p:style>
-          <a:lnRef idx="1">
-            <a:schemeClr val="accent1"/>
-          </a:lnRef>
-          <a:fillRef idx="0">
-            <a:schemeClr val="accent1"/>
-          </a:fillRef>
-          <a:effectRef idx="0">
-            <a:schemeClr val="accent1"/>
-          </a:effectRef>
-          <a:fontRef idx="minor">
-            <a:schemeClr val="tx1"/>
-          </a:fontRef>
-        </p:style>
-      </p:cxnSp>
-      <p:sp>
-        <p:nvSpPr>
-          <p:cNvPr id="23" name="Text Box 11">
-            <a:extLst>
-              <a:ext uri="{FF2B5EF4-FFF2-40B4-BE49-F238E27FC236}">
-                <a16:creationId xmlns:a16="http://schemas.microsoft.com/office/drawing/2014/main" id="{1506E43E-50C1-4D7A-A342-B2AC6E97C2F3}"/>
-              </a:ext>
-            </a:extLst>
-          </p:cNvPr>
-          <p:cNvSpPr txBox="1"/>
-          <p:nvPr/>
-        </p:nvSpPr>
-        <p:spPr>
-          <a:xfrm>
-            <a:off x="4318981" y="3558281"/>
-            <a:ext cx="3217891" cy="612694"/>
-          </a:xfrm>
-          <a:prstGeom prst="rect">
-            <a:avLst/>
-          </a:prstGeom>
-          <a:noFill/>
-          <a:ln w="6350">
-            <a:noFill/>
-          </a:ln>
-        </p:spPr>
-        <p:txBody>
-          <a:bodyPr rot="0" spcFirstLastPara="0" vert="horz" wrap="square" lIns="91440" tIns="45720" rIns="91440" bIns="45720" numCol="1" spcCol="0" rtlCol="0" fromWordArt="0" anchor="t" anchorCtr="0" forceAA="0" compatLnSpc="1">
-            <a:prstTxWarp prst="textNoShape">
-              <a:avLst/>
-            </a:prstTxWarp>
-            <a:noAutofit/>
-          </a:bodyPr>
-          <a:lstStyle/>
-          <a:p>
-            <a:pPr algn="just">
-              <a:spcAft>
-                <a:spcPts val="0"/>
-              </a:spcAft>
-            </a:pPr>
-            <a:r>
-              <a:rPr lang="zh-CN" altLang="en-US" sz="1400" kern="100" dirty="0">
-                <a:effectLst/>
-                <a:latin typeface="等线" panose="02010600030101010101" pitchFamily="2" charset="-122"/>
-                <a:ea typeface="等线" panose="02010600030101010101" pitchFamily="2" charset="-122"/>
-                <a:cs typeface="Times New Roman" panose="02020603050405020304" pitchFamily="18" charset="0"/>
-              </a:rPr>
-              <a:t>节拍器指示，选不同的位置可以选择重音在第几拍</a:t>
-            </a:r>
-            <a:endParaRPr lang="zh-CN" sz="1400" kern="100" dirty="0">
-              <a:effectLst/>
-              <a:latin typeface="等线" panose="02010600030101010101" pitchFamily="2" charset="-122"/>
-              <a:ea typeface="等线" panose="02010600030101010101" pitchFamily="2" charset="-122"/>
-              <a:cs typeface="Times New Roman" panose="02020603050405020304" pitchFamily="18" charset="0"/>
-            </a:endParaRPr>
-          </a:p>
-        </p:txBody>
-      </p:sp>
-      <p:cxnSp>
-        <p:nvCxnSpPr>
-          <p:cNvPr id="24" name="Straight Connector 23">
-            <a:extLst>
-              <a:ext uri="{FF2B5EF4-FFF2-40B4-BE49-F238E27FC236}">
-                <a16:creationId xmlns:a16="http://schemas.microsoft.com/office/drawing/2014/main" id="{C3AE9FE3-E92B-479F-BAD6-0766C5E600A9}"/>
-              </a:ext>
-            </a:extLst>
-          </p:cNvPr>
-          <p:cNvCxnSpPr>
-            <a:cxnSpLocks/>
-          </p:cNvCxnSpPr>
-          <p:nvPr/>
-        </p:nvCxnSpPr>
-        <p:spPr>
-          <a:xfrm>
-            <a:off x="4353715" y="4104474"/>
-            <a:ext cx="3127739" cy="0"/>
-          </a:xfrm>
-          <a:prstGeom prst="line">
-            <a:avLst/>
-          </a:prstGeom>
-          <a:ln w="28575">
-            <a:headEnd type="none" w="med" len="med"/>
-            <a:tailEnd type="none" w="med" len="med"/>
-          </a:ln>
-        </p:spPr>
-        <p:style>
-          <a:lnRef idx="1">
-            <a:schemeClr val="accent1"/>
-          </a:lnRef>
-          <a:fillRef idx="0">
-            <a:schemeClr val="accent1"/>
-          </a:fillRef>
-          <a:effectRef idx="0">
-            <a:schemeClr val="accent1"/>
-          </a:effectRef>
-          <a:fontRef idx="minor">
-            <a:schemeClr val="tx1"/>
-          </a:fontRef>
-        </p:style>
-      </p:cxnSp>
-      <p:cxnSp>
-        <p:nvCxnSpPr>
-          <p:cNvPr id="27" name="Straight Arrow Connector 26">
-            <a:extLst>
-              <a:ext uri="{FF2B5EF4-FFF2-40B4-BE49-F238E27FC236}">
-                <a16:creationId xmlns:a16="http://schemas.microsoft.com/office/drawing/2014/main" id="{D9950E74-0C00-432A-B533-43C34DCDA309}"/>
-              </a:ext>
-            </a:extLst>
-          </p:cNvPr>
-          <p:cNvCxnSpPr>
-            <a:cxnSpLocks/>
-          </p:cNvCxnSpPr>
-          <p:nvPr/>
-        </p:nvCxnSpPr>
-        <p:spPr>
-          <a:xfrm flipH="1" flipV="1">
-            <a:off x="6634167" y="2305396"/>
-            <a:ext cx="8697" cy="1084817"/>
-          </a:xfrm>
-          <a:prstGeom prst="straightConnector1">
-            <a:avLst/>
-          </a:prstGeom>
-          <a:ln w="28575">
-            <a:tailEnd type="triangle"/>
-          </a:ln>
-        </p:spPr>
-        <p:style>
-          <a:lnRef idx="1">
-            <a:schemeClr val="accent1"/>
-          </a:lnRef>
-          <a:fillRef idx="0">
-            <a:schemeClr val="accent1"/>
-          </a:fillRef>
-          <a:effectRef idx="0">
-            <a:schemeClr val="accent1"/>
-          </a:effectRef>
-          <a:fontRef idx="minor">
-            <a:schemeClr val="tx1"/>
-          </a:fontRef>
-        </p:style>
-      </p:cxnSp>
-      <p:sp>
-        <p:nvSpPr>
-          <p:cNvPr id="28" name="Text Box 11">
-            <a:extLst>
-              <a:ext uri="{FF2B5EF4-FFF2-40B4-BE49-F238E27FC236}">
-                <a16:creationId xmlns:a16="http://schemas.microsoft.com/office/drawing/2014/main" id="{662B9F85-56C3-4E59-8BFA-B04C6EFB5C9E}"/>
-              </a:ext>
-            </a:extLst>
-          </p:cNvPr>
-          <p:cNvSpPr txBox="1"/>
-          <p:nvPr/>
-        </p:nvSpPr>
-        <p:spPr>
-          <a:xfrm>
-            <a:off x="6595866" y="2844016"/>
-            <a:ext cx="3217891" cy="612694"/>
-          </a:xfrm>
-          <a:prstGeom prst="rect">
-            <a:avLst/>
-          </a:prstGeom>
-          <a:noFill/>
-          <a:ln w="6350">
-            <a:noFill/>
-          </a:ln>
-        </p:spPr>
-        <p:txBody>
-          <a:bodyPr rot="0" spcFirstLastPara="0" vert="horz" wrap="square" lIns="91440" tIns="45720" rIns="91440" bIns="45720" numCol="1" spcCol="0" rtlCol="0" fromWordArt="0" anchor="t" anchorCtr="0" forceAA="0" compatLnSpc="1">
-            <a:prstTxWarp prst="textNoShape">
-              <a:avLst/>
-            </a:prstTxWarp>
-            <a:noAutofit/>
-          </a:bodyPr>
-          <a:lstStyle/>
-          <a:p>
-            <a:pPr algn="just">
-              <a:spcAft>
-                <a:spcPts val="0"/>
-              </a:spcAft>
-            </a:pPr>
-            <a:r>
-              <a:rPr lang="zh-CN" altLang="en-US" sz="1400" kern="100" dirty="0">
-                <a:effectLst/>
-                <a:latin typeface="等线" panose="02010600030101010101" pitchFamily="2" charset="-122"/>
-                <a:ea typeface="等线" panose="02010600030101010101" pitchFamily="2" charset="-122"/>
-                <a:cs typeface="Times New Roman" panose="02020603050405020304" pitchFamily="18" charset="0"/>
-              </a:rPr>
-              <a:t>节拍选择</a:t>
-            </a:r>
-            <a:r>
-              <a:rPr lang="zh-CN" altLang="en-US" sz="1400" kern="100" dirty="0">
-                <a:latin typeface="等线" panose="02010600030101010101" pitchFamily="2" charset="-122"/>
-                <a:ea typeface="等线" panose="02010600030101010101" pitchFamily="2" charset="-122"/>
-                <a:cs typeface="Times New Roman" panose="02020603050405020304" pitchFamily="18" charset="0"/>
-              </a:rPr>
-              <a:t>，默认节拍器打</a:t>
-            </a:r>
-            <a:r>
-              <a:rPr lang="en-US" altLang="zh-CN" sz="1400" kern="100" dirty="0">
-                <a:latin typeface="等线" panose="02010600030101010101" pitchFamily="2" charset="-122"/>
-                <a:ea typeface="等线" panose="02010600030101010101" pitchFamily="2" charset="-122"/>
-                <a:cs typeface="Times New Roman" panose="02020603050405020304" pitchFamily="18" charset="0"/>
-              </a:rPr>
-              <a:t>1/4</a:t>
-            </a:r>
-            <a:r>
-              <a:rPr lang="zh-CN" altLang="en-US" sz="1400" kern="100" dirty="0">
-                <a:latin typeface="等线" panose="02010600030101010101" pitchFamily="2" charset="-122"/>
-                <a:ea typeface="等线" panose="02010600030101010101" pitchFamily="2" charset="-122"/>
-                <a:cs typeface="Times New Roman" panose="02020603050405020304" pitchFamily="18" charset="0"/>
-              </a:rPr>
-              <a:t>拍，勾选之后节拍器打</a:t>
-            </a:r>
-            <a:r>
-              <a:rPr lang="en-US" altLang="zh-CN" sz="1400" kern="100" dirty="0">
-                <a:latin typeface="等线" panose="02010600030101010101" pitchFamily="2" charset="-122"/>
-                <a:ea typeface="等线" panose="02010600030101010101" pitchFamily="2" charset="-122"/>
-                <a:cs typeface="Times New Roman" panose="02020603050405020304" pitchFamily="18" charset="0"/>
-              </a:rPr>
-              <a:t>1/16</a:t>
-            </a:r>
-            <a:r>
-              <a:rPr lang="zh-CN" altLang="en-US" sz="1400" kern="100" dirty="0">
-                <a:latin typeface="等线" panose="02010600030101010101" pitchFamily="2" charset="-122"/>
-                <a:ea typeface="等线" panose="02010600030101010101" pitchFamily="2" charset="-122"/>
-                <a:cs typeface="Times New Roman" panose="02020603050405020304" pitchFamily="18" charset="0"/>
-              </a:rPr>
-              <a:t>拍</a:t>
-            </a:r>
-            <a:endParaRPr lang="zh-CN" sz="1400" kern="100" dirty="0">
-              <a:effectLst/>
-              <a:latin typeface="等线" panose="02010600030101010101" pitchFamily="2" charset="-122"/>
-              <a:ea typeface="等线" panose="02010600030101010101" pitchFamily="2" charset="-122"/>
-              <a:cs typeface="Times New Roman" panose="02020603050405020304" pitchFamily="18" charset="0"/>
-            </a:endParaRPr>
-          </a:p>
-        </p:txBody>
-      </p:sp>
-      <p:cxnSp>
-        <p:nvCxnSpPr>
-          <p:cNvPr id="29" name="Straight Connector 28">
-            <a:extLst>
-              <a:ext uri="{FF2B5EF4-FFF2-40B4-BE49-F238E27FC236}">
-                <a16:creationId xmlns:a16="http://schemas.microsoft.com/office/drawing/2014/main" id="{4283E841-CEEA-49B3-9F01-981F8ABF7BA6}"/>
-              </a:ext>
-            </a:extLst>
-          </p:cNvPr>
-          <p:cNvCxnSpPr>
-            <a:cxnSpLocks/>
-          </p:cNvCxnSpPr>
-          <p:nvPr/>
-        </p:nvCxnSpPr>
-        <p:spPr>
-          <a:xfrm>
-            <a:off x="6630600" y="3390209"/>
-            <a:ext cx="3100833" cy="0"/>
-          </a:xfrm>
-          <a:prstGeom prst="line">
-            <a:avLst/>
-          </a:prstGeom>
-          <a:ln w="28575">
-            <a:headEnd type="none" w="med" len="med"/>
-            <a:tailEnd type="none" w="med" len="med"/>
-          </a:ln>
-        </p:spPr>
-        <p:style>
-          <a:lnRef idx="1">
-            <a:schemeClr val="accent1"/>
-          </a:lnRef>
-          <a:fillRef idx="0">
-            <a:schemeClr val="accent1"/>
-          </a:fillRef>
-          <a:effectRef idx="0">
-            <a:schemeClr val="accent1"/>
-          </a:effectRef>
-          <a:fontRef idx="minor">
-            <a:schemeClr val="tx1"/>
-          </a:fontRef>
-        </p:style>
-      </p:cxnSp>
-      <p:cxnSp>
-        <p:nvCxnSpPr>
-          <p:cNvPr id="34" name="Straight Arrow Connector 33">
-            <a:extLst>
-              <a:ext uri="{FF2B5EF4-FFF2-40B4-BE49-F238E27FC236}">
-                <a16:creationId xmlns:a16="http://schemas.microsoft.com/office/drawing/2014/main" id="{3BE0A191-2EBB-4454-AC92-4F3F7F1462DF}"/>
-              </a:ext>
-            </a:extLst>
-          </p:cNvPr>
-          <p:cNvCxnSpPr>
-            <a:cxnSpLocks/>
-          </p:cNvCxnSpPr>
-          <p:nvPr/>
-        </p:nvCxnSpPr>
-        <p:spPr>
-          <a:xfrm flipH="1">
-            <a:off x="8693337" y="1277765"/>
-            <a:ext cx="1" cy="557268"/>
-          </a:xfrm>
-          <a:prstGeom prst="straightConnector1">
-            <a:avLst/>
-          </a:prstGeom>
-          <a:ln w="28575">
-            <a:tailEnd type="triangle"/>
-          </a:ln>
-        </p:spPr>
-        <p:style>
-          <a:lnRef idx="1">
-            <a:schemeClr val="accent1"/>
-          </a:lnRef>
-          <a:fillRef idx="0">
-            <a:schemeClr val="accent1"/>
-          </a:fillRef>
-          <a:effectRef idx="0">
-            <a:schemeClr val="accent1"/>
-          </a:effectRef>
-          <a:fontRef idx="minor">
-            <a:schemeClr val="tx1"/>
-          </a:fontRef>
-        </p:style>
-      </p:cxnSp>
-      <p:sp>
-        <p:nvSpPr>
-          <p:cNvPr id="35" name="Text Box 11">
-            <a:extLst>
-              <a:ext uri="{FF2B5EF4-FFF2-40B4-BE49-F238E27FC236}">
-                <a16:creationId xmlns:a16="http://schemas.microsoft.com/office/drawing/2014/main" id="{4B904B8A-B999-466D-A8A8-8CE76696550B}"/>
-              </a:ext>
-            </a:extLst>
-          </p:cNvPr>
-          <p:cNvSpPr txBox="1"/>
-          <p:nvPr/>
-        </p:nvSpPr>
-        <p:spPr>
-          <a:xfrm>
-            <a:off x="5132826" y="731567"/>
-            <a:ext cx="3217891" cy="612694"/>
-          </a:xfrm>
-          <a:prstGeom prst="rect">
-            <a:avLst/>
-          </a:prstGeom>
-          <a:noFill/>
-          <a:ln w="6350">
-            <a:noFill/>
-          </a:ln>
-        </p:spPr>
-        <p:txBody>
-          <a:bodyPr rot="0" spcFirstLastPara="0" vert="horz" wrap="square" lIns="91440" tIns="45720" rIns="91440" bIns="45720" numCol="1" spcCol="0" rtlCol="0" fromWordArt="0" anchor="t" anchorCtr="0" forceAA="0" compatLnSpc="1">
-            <a:prstTxWarp prst="textNoShape">
-              <a:avLst/>
-            </a:prstTxWarp>
-            <a:noAutofit/>
-          </a:bodyPr>
-          <a:lstStyle/>
-          <a:p>
-            <a:pPr algn="just">
-              <a:spcAft>
-                <a:spcPts val="0"/>
-              </a:spcAft>
-            </a:pPr>
-            <a:r>
-              <a:rPr lang="zh-CN" altLang="en-US" sz="1400" kern="100" dirty="0">
-                <a:latin typeface="等线" panose="02010600030101010101" pitchFamily="2" charset="-122"/>
-                <a:ea typeface="等线" panose="02010600030101010101" pitchFamily="2" charset="-122"/>
-                <a:cs typeface="Times New Roman" panose="02020603050405020304" pitchFamily="18" charset="0"/>
-              </a:rPr>
-              <a:t>勾选之后会把节奏型用钢琴的声音播放出来，很有用！</a:t>
-            </a:r>
-            <a:endParaRPr lang="zh-CN" sz="1400" kern="100" dirty="0">
-              <a:effectLst/>
-              <a:latin typeface="等线" panose="02010600030101010101" pitchFamily="2" charset="-122"/>
-              <a:ea typeface="等线" panose="02010600030101010101" pitchFamily="2" charset="-122"/>
-              <a:cs typeface="Times New Roman" panose="02020603050405020304" pitchFamily="18" charset="0"/>
-            </a:endParaRPr>
-          </a:p>
-        </p:txBody>
-      </p:sp>
-      <p:cxnSp>
-        <p:nvCxnSpPr>
-          <p:cNvPr id="36" name="Straight Connector 35">
-            <a:extLst>
-              <a:ext uri="{FF2B5EF4-FFF2-40B4-BE49-F238E27FC236}">
-                <a16:creationId xmlns:a16="http://schemas.microsoft.com/office/drawing/2014/main" id="{D5217038-8608-428C-ADB4-866D07B983B7}"/>
-              </a:ext>
-            </a:extLst>
-          </p:cNvPr>
-          <p:cNvCxnSpPr>
-            <a:cxnSpLocks/>
-          </p:cNvCxnSpPr>
-          <p:nvPr/>
-        </p:nvCxnSpPr>
-        <p:spPr>
-          <a:xfrm>
-            <a:off x="5167560" y="1277760"/>
-            <a:ext cx="3525777" cy="0"/>
-          </a:xfrm>
-          <a:prstGeom prst="line">
-            <a:avLst/>
-          </a:prstGeom>
-          <a:ln w="28575">
-            <a:headEnd type="none" w="med" len="med"/>
-            <a:tailEnd type="none" w="med" len="med"/>
-          </a:ln>
-        </p:spPr>
-        <p:style>
-          <a:lnRef idx="1">
-            <a:schemeClr val="accent1"/>
-          </a:lnRef>
-          <a:fillRef idx="0">
-            <a:schemeClr val="accent1"/>
-          </a:fillRef>
-          <a:effectRef idx="0">
-            <a:schemeClr val="accent1"/>
-          </a:effectRef>
-          <a:fontRef idx="minor">
-            <a:schemeClr val="tx1"/>
-          </a:fontRef>
-        </p:style>
-      </p:cxnSp>
-      <p:cxnSp>
-        <p:nvCxnSpPr>
-          <p:cNvPr id="39" name="Straight Arrow Connector 38">
-            <a:extLst>
-              <a:ext uri="{FF2B5EF4-FFF2-40B4-BE49-F238E27FC236}">
-                <a16:creationId xmlns:a16="http://schemas.microsoft.com/office/drawing/2014/main" id="{B45A083E-43DE-4ABD-B6A5-A9300661BD93}"/>
-              </a:ext>
-            </a:extLst>
-          </p:cNvPr>
-          <p:cNvCxnSpPr>
-            <a:cxnSpLocks/>
-          </p:cNvCxnSpPr>
-          <p:nvPr/>
-        </p:nvCxnSpPr>
-        <p:spPr>
-          <a:xfrm flipH="1">
-            <a:off x="10355883" y="630001"/>
-            <a:ext cx="1" cy="1071862"/>
-          </a:xfrm>
-          <a:prstGeom prst="straightConnector1">
-            <a:avLst/>
-          </a:prstGeom>
-          <a:ln w="28575">
-            <a:tailEnd type="triangle"/>
-          </a:ln>
-        </p:spPr>
-        <p:style>
-          <a:lnRef idx="1">
-            <a:schemeClr val="accent1"/>
-          </a:lnRef>
-          <a:fillRef idx="0">
-            <a:schemeClr val="accent1"/>
-          </a:fillRef>
-          <a:effectRef idx="0">
-            <a:schemeClr val="accent1"/>
-          </a:effectRef>
-          <a:fontRef idx="minor">
-            <a:schemeClr val="tx1"/>
-          </a:fontRef>
-        </p:style>
-      </p:cxnSp>
-      <p:sp>
-        <p:nvSpPr>
-          <p:cNvPr id="40" name="Text Box 11">
-            <a:extLst>
-              <a:ext uri="{FF2B5EF4-FFF2-40B4-BE49-F238E27FC236}">
-                <a16:creationId xmlns:a16="http://schemas.microsoft.com/office/drawing/2014/main" id="{C76602E1-E421-4D52-B082-8E7232B7417F}"/>
-              </a:ext>
-            </a:extLst>
-          </p:cNvPr>
-          <p:cNvSpPr txBox="1"/>
-          <p:nvPr/>
-        </p:nvSpPr>
-        <p:spPr>
-          <a:xfrm>
-            <a:off x="6795371" y="83803"/>
-            <a:ext cx="3217891" cy="612694"/>
-          </a:xfrm>
-          <a:prstGeom prst="rect">
-            <a:avLst/>
-          </a:prstGeom>
-          <a:noFill/>
-          <a:ln w="6350">
-            <a:noFill/>
-          </a:ln>
-        </p:spPr>
-        <p:txBody>
-          <a:bodyPr rot="0" spcFirstLastPara="0" vert="horz" wrap="square" lIns="91440" tIns="45720" rIns="91440" bIns="45720" numCol="1" spcCol="0" rtlCol="0" fromWordArt="0" anchor="t" anchorCtr="0" forceAA="0" compatLnSpc="1">
-            <a:prstTxWarp prst="textNoShape">
-              <a:avLst/>
-            </a:prstTxWarp>
-            <a:noAutofit/>
-          </a:bodyPr>
-          <a:lstStyle/>
-          <a:p>
-            <a:pPr algn="just">
-              <a:spcAft>
-                <a:spcPts val="0"/>
-              </a:spcAft>
-            </a:pPr>
-            <a:r>
-              <a:rPr lang="zh-CN" altLang="en-US" sz="1400" kern="100" dirty="0">
-                <a:effectLst/>
-                <a:latin typeface="等线" panose="02010600030101010101" pitchFamily="2" charset="-122"/>
-                <a:ea typeface="等线" panose="02010600030101010101" pitchFamily="2" charset="-122"/>
-                <a:cs typeface="Times New Roman" panose="02020603050405020304" pitchFamily="18" charset="0"/>
-              </a:rPr>
-              <a:t>不选的话每次换新的小节之前会有四拍准备，勾选之后直接进入播放</a:t>
-            </a:r>
-            <a:endParaRPr lang="zh-CN" sz="1400" kern="100" dirty="0">
-              <a:effectLst/>
-              <a:latin typeface="等线" panose="02010600030101010101" pitchFamily="2" charset="-122"/>
-              <a:ea typeface="等线" panose="02010600030101010101" pitchFamily="2" charset="-122"/>
-              <a:cs typeface="Times New Roman" panose="02020603050405020304" pitchFamily="18" charset="0"/>
-            </a:endParaRPr>
-          </a:p>
-        </p:txBody>
-      </p:sp>
-      <p:cxnSp>
-        <p:nvCxnSpPr>
-          <p:cNvPr id="41" name="Straight Connector 40">
-            <a:extLst>
-              <a:ext uri="{FF2B5EF4-FFF2-40B4-BE49-F238E27FC236}">
-                <a16:creationId xmlns:a16="http://schemas.microsoft.com/office/drawing/2014/main" id="{DDBFCDF0-6954-405B-AC3B-9E13E6FCE23E}"/>
-              </a:ext>
-            </a:extLst>
-          </p:cNvPr>
-          <p:cNvCxnSpPr>
-            <a:cxnSpLocks/>
-          </p:cNvCxnSpPr>
-          <p:nvPr/>
-        </p:nvCxnSpPr>
-        <p:spPr>
-          <a:xfrm>
-            <a:off x="6830105" y="629996"/>
-            <a:ext cx="3525777" cy="0"/>
-          </a:xfrm>
-          <a:prstGeom prst="line">
-            <a:avLst/>
-          </a:prstGeom>
-          <a:ln w="28575">
-            <a:headEnd type="none" w="med" len="med"/>
-            <a:tailEnd type="none" w="med" len="med"/>
-          </a:ln>
-        </p:spPr>
-        <p:style>
-          <a:lnRef idx="1">
-            <a:schemeClr val="accent1"/>
-          </a:lnRef>
-          <a:fillRef idx="0">
-            <a:schemeClr val="accent1"/>
-          </a:fillRef>
-          <a:effectRef idx="0">
-            <a:schemeClr val="accent1"/>
-          </a:effectRef>
-          <a:fontRef idx="minor">
-            <a:schemeClr val="tx1"/>
-          </a:fontRef>
-        </p:style>
-      </p:cxnSp>
-      <p:sp>
-        <p:nvSpPr>
-          <p:cNvPr id="44" name="Text Box 11">
-            <a:extLst>
-              <a:ext uri="{FF2B5EF4-FFF2-40B4-BE49-F238E27FC236}">
-                <a16:creationId xmlns:a16="http://schemas.microsoft.com/office/drawing/2014/main" id="{64B972C1-5A57-40CD-9933-BDB5DD611612}"/>
-              </a:ext>
-            </a:extLst>
-          </p:cNvPr>
-          <p:cNvSpPr txBox="1"/>
-          <p:nvPr/>
-        </p:nvSpPr>
-        <p:spPr>
-          <a:xfrm>
-            <a:off x="6815428" y="4717843"/>
-            <a:ext cx="3968950" cy="1510155"/>
-          </a:xfrm>
-          <a:prstGeom prst="rect">
-            <a:avLst/>
-          </a:prstGeom>
-          <a:noFill/>
-          <a:ln w="6350">
-            <a:noFill/>
-          </a:ln>
-        </p:spPr>
-        <p:txBody>
-          <a:bodyPr rot="0" spcFirstLastPara="0" vert="horz" wrap="square" lIns="91440" tIns="45720" rIns="91440" bIns="45720" numCol="1" spcCol="0" rtlCol="0" fromWordArt="0" anchor="t" anchorCtr="0" forceAA="0" compatLnSpc="1">
-            <a:prstTxWarp prst="textNoShape">
-              <a:avLst/>
-            </a:prstTxWarp>
-            <a:noAutofit/>
-          </a:bodyPr>
-          <a:lstStyle/>
-          <a:p>
-            <a:pPr algn="just">
-              <a:spcAft>
-                <a:spcPts val="0"/>
-              </a:spcAft>
-            </a:pPr>
-            <a:r>
-              <a:rPr lang="zh-CN" altLang="en-US" sz="1400" kern="100" dirty="0">
-                <a:effectLst/>
-                <a:latin typeface="等线" panose="02010600030101010101" pitchFamily="2" charset="-122"/>
-                <a:ea typeface="等线" panose="02010600030101010101" pitchFamily="2" charset="-122"/>
-                <a:cs typeface="Times New Roman" panose="02020603050405020304" pitchFamily="18" charset="0"/>
-              </a:rPr>
-              <a:t>节拍器会有三种声音：</a:t>
-            </a:r>
-            <a:endParaRPr lang="en-US" altLang="zh-CN" sz="1400" kern="100" dirty="0">
-              <a:effectLst/>
-              <a:latin typeface="等线" panose="02010600030101010101" pitchFamily="2" charset="-122"/>
-              <a:ea typeface="等线" panose="02010600030101010101" pitchFamily="2" charset="-122"/>
-              <a:cs typeface="Times New Roman" panose="02020603050405020304" pitchFamily="18" charset="0"/>
-            </a:endParaRPr>
-          </a:p>
-          <a:p>
-            <a:pPr algn="just">
-              <a:spcAft>
-                <a:spcPts val="0"/>
-              </a:spcAft>
-            </a:pPr>
-            <a:r>
-              <a:rPr lang="zh-CN" altLang="en-US" sz="1400" kern="100" dirty="0">
-                <a:latin typeface="等线" panose="02010600030101010101" pitchFamily="2" charset="-122"/>
-                <a:cs typeface="Times New Roman" panose="02020603050405020304" pitchFamily="18" charset="0"/>
-              </a:rPr>
-              <a:t>“咚咚咚咚”</a:t>
-            </a:r>
-            <a:r>
-              <a:rPr lang="zh-CN" altLang="en-US" sz="1400" kern="100" dirty="0">
-                <a:effectLst/>
-                <a:latin typeface="等线" panose="02010600030101010101" pitchFamily="2" charset="-122"/>
-                <a:ea typeface="等线" panose="02010600030101010101" pitchFamily="2" charset="-122"/>
-                <a:cs typeface="Times New Roman" panose="02020603050405020304" pitchFamily="18" charset="0"/>
-              </a:rPr>
-              <a:t>是准备拍</a:t>
-            </a:r>
-            <a:endParaRPr lang="en-US" altLang="zh-CN" sz="1400" kern="100" dirty="0">
-              <a:effectLst/>
-              <a:latin typeface="等线" panose="02010600030101010101" pitchFamily="2" charset="-122"/>
-              <a:ea typeface="等线" panose="02010600030101010101" pitchFamily="2" charset="-122"/>
-              <a:cs typeface="Times New Roman" panose="02020603050405020304" pitchFamily="18" charset="0"/>
-            </a:endParaRPr>
-          </a:p>
-          <a:p>
-            <a:pPr algn="just">
-              <a:spcAft>
-                <a:spcPts val="0"/>
-              </a:spcAft>
-            </a:pPr>
-            <a:r>
-              <a:rPr lang="zh-CN" altLang="en-US" sz="1400" kern="100" dirty="0">
-                <a:effectLst/>
-                <a:latin typeface="等线" panose="02010600030101010101" pitchFamily="2" charset="-122"/>
-                <a:ea typeface="等线" panose="02010600030101010101" pitchFamily="2" charset="-122"/>
-                <a:cs typeface="Times New Roman" panose="02020603050405020304" pitchFamily="18" charset="0"/>
-              </a:rPr>
-              <a:t>之后“滴”是强拍，“嗒”是弱拍</a:t>
-            </a:r>
-            <a:endParaRPr lang="zh-CN" sz="1400" kern="100" dirty="0">
-              <a:effectLst/>
-              <a:latin typeface="等线" panose="02010600030101010101" pitchFamily="2" charset="-122"/>
-              <a:ea typeface="等线" panose="02010600030101010101" pitchFamily="2" charset="-122"/>
-              <a:cs typeface="Times New Roman" panose="02020603050405020304" pitchFamily="18" charset="0"/>
-            </a:endParaRPr>
+              <a:t>常见</a:t>
+            </a:r>
+            <a:r>
+              <a:rPr lang="en-US" altLang="zh-CN" dirty="0"/>
+              <a:t>/</a:t>
+            </a:r>
+            <a:r>
+              <a:rPr lang="zh-CN" altLang="en-US" dirty="0"/>
+              <a:t>已知问题</a:t>
+            </a:r>
+          </a:p>
+        </p:txBody>
+      </p:sp>
+      <p:sp>
+        <p:nvSpPr>
+          <p:cNvPr id="3" name="Content Placeholder 2">
+            <a:extLst>
+              <a:ext uri="{FF2B5EF4-FFF2-40B4-BE49-F238E27FC236}">
+                <a16:creationId xmlns:a16="http://schemas.microsoft.com/office/drawing/2014/main" id="{3B14730C-72FE-4C3D-B9E3-6BDFEAC6CBE6}"/>
+              </a:ext>
+            </a:extLst>
+          </p:cNvPr>
+          <p:cNvSpPr>
+            <a:spLocks noGrp="1"/>
+          </p:cNvSpPr>
+          <p:nvPr>
+            <p:ph idx="1"/>
+          </p:nvPr>
+        </p:nvSpPr>
+        <p:spPr/>
+        <p:txBody>
+          <a:bodyPr/>
+          <a:lstStyle/>
+          <a:p>
+            <a:r>
+              <a:rPr lang="zh-CN" altLang="en-US" dirty="0"/>
+              <a:t>一开始最上面的节拍器部分会显示一个加载的状态，需要几秒钟时间，在加载完成之前不要播放</a:t>
+            </a:r>
+            <a:endParaRPr lang="en-US" altLang="zh-CN" dirty="0"/>
+          </a:p>
+          <a:p>
+            <a:r>
+              <a:rPr lang="zh-CN" altLang="en-US" dirty="0"/>
+              <a:t>在</a:t>
+            </a:r>
+            <a:r>
+              <a:rPr lang="en-US" altLang="zh-CN" dirty="0"/>
+              <a:t>iPad/iPhone</a:t>
+            </a:r>
+            <a:r>
+              <a:rPr lang="zh-CN" altLang="en-US" dirty="0"/>
+              <a:t>上如果网页长时间不用下次进来有时候出现播放不出声音的情况，刷新网页可以解决</a:t>
+            </a:r>
+            <a:endParaRPr lang="en-US" altLang="zh-CN" dirty="0"/>
+          </a:p>
+          <a:p>
+            <a:r>
+              <a:rPr lang="zh-CN" altLang="en-US"/>
+              <a:t>如果节拍器设置被改变会自动重新开始当前小节</a:t>
+            </a:r>
+            <a:endParaRPr lang="zh-CN" altLang="en-US" dirty="0"/>
           </a:p>
         </p:txBody>
       </p:sp>
     </p:spTree>
     <p:extLst>
       <p:ext uri="{BB962C8B-B14F-4D97-AF65-F5344CB8AC3E}">
-        <p14:creationId xmlns:p14="http://schemas.microsoft.com/office/powerpoint/2010/main" val="270918078"/>
+        <p14:creationId xmlns:p14="http://schemas.microsoft.com/office/powerpoint/2010/main" val="485479863"/>
       </p:ext>
     </p:extLst>
   </p:cSld>
@@ -5356,7 +4475,7 @@
           <p:cNvPr id="2" name="Title 1">
             <a:extLst>
               <a:ext uri="{FF2B5EF4-FFF2-40B4-BE49-F238E27FC236}">
-                <a16:creationId xmlns:a16="http://schemas.microsoft.com/office/drawing/2014/main" id="{E2EAB8F1-FE5C-4C0F-8F46-F694F16FB1A2}"/>
+                <a16:creationId xmlns:a16="http://schemas.microsoft.com/office/drawing/2014/main" id="{78C28B33-F57D-4BDA-9D1D-274BBD14F3EC}"/>
               </a:ext>
             </a:extLst>
           </p:cNvPr>
@@ -5374,7 +4493,7 @@
           <a:p>
             <a:r>
               <a:rPr lang="zh-CN" altLang="en-US" dirty="0"/>
-              <a:t>节奏型控制</a:t>
+              <a:t>节拍器控制</a:t>
             </a:r>
           </a:p>
         </p:txBody>
@@ -5384,13 +4503,11 @@
           <p:cNvPr id="3" name="Picture 2">
             <a:extLst>
               <a:ext uri="{FF2B5EF4-FFF2-40B4-BE49-F238E27FC236}">
-                <a16:creationId xmlns:a16="http://schemas.microsoft.com/office/drawing/2014/main" id="{F46406C0-13DE-4CC3-88DE-7638394977FE}"/>
-              </a:ext>
-            </a:extLst>
-          </p:cNvPr>
-          <p:cNvPicPr>
-            <a:picLocks noChangeAspect="1"/>
-          </p:cNvPicPr>
+                <a16:creationId xmlns:a16="http://schemas.microsoft.com/office/drawing/2014/main" id="{20241DD7-1EA0-4F58-AE61-5D099DA76A84}"/>
+              </a:ext>
+            </a:extLst>
+          </p:cNvPr>
+          <p:cNvPicPr/>
           <p:nvPr/>
         </p:nvPicPr>
         <p:blipFill>
@@ -5401,8 +4518,8 @@
         </p:blipFill>
         <p:spPr>
           <a:xfrm>
-            <a:off x="838200" y="1690688"/>
-            <a:ext cx="10515600" cy="914400"/>
+            <a:off x="904066" y="1467630"/>
+            <a:ext cx="10495669" cy="909810"/>
           </a:xfrm>
           <a:prstGeom prst="rect">
             <a:avLst/>
@@ -5414,7 +4531,7 @@
           <p:cNvPr id="4" name="Straight Arrow Connector 3">
             <a:extLst>
               <a:ext uri="{FF2B5EF4-FFF2-40B4-BE49-F238E27FC236}">
-                <a16:creationId xmlns:a16="http://schemas.microsoft.com/office/drawing/2014/main" id="{B44E9C1A-E3F8-4653-8EBD-9C19DE439255}"/>
+                <a16:creationId xmlns:a16="http://schemas.microsoft.com/office/drawing/2014/main" id="{CEEB00A5-61F3-44DA-AF7A-A519DB1C28D9}"/>
               </a:ext>
             </a:extLst>
           </p:cNvPr>
@@ -5425,7 +4542,7 @@
         </p:nvCxnSpPr>
         <p:spPr>
           <a:xfrm flipH="1" flipV="1">
-            <a:off x="3109619" y="2366357"/>
+            <a:off x="1502492" y="2377440"/>
             <a:ext cx="26075" cy="3252919"/>
           </a:xfrm>
           <a:prstGeom prst="straightConnector1">
@@ -5455,7 +4572,7 @@
           <p:cNvPr id="5" name="Text Box 11">
             <a:extLst>
               <a:ext uri="{FF2B5EF4-FFF2-40B4-BE49-F238E27FC236}">
-                <a16:creationId xmlns:a16="http://schemas.microsoft.com/office/drawing/2014/main" id="{45C4A0FB-0954-4272-BEC0-7834212BD7FE}"/>
+                <a16:creationId xmlns:a16="http://schemas.microsoft.com/office/drawing/2014/main" id="{00D69AC1-B50A-4466-96A4-B930ACEC4080}"/>
               </a:ext>
             </a:extLst>
           </p:cNvPr>
@@ -5464,8 +4581,8 @@
         </p:nvSpPr>
         <p:spPr>
           <a:xfrm>
-            <a:off x="3088697" y="5059679"/>
-            <a:ext cx="5296073" cy="626095"/>
+            <a:off x="1481571" y="5083882"/>
+            <a:ext cx="3217891" cy="612976"/>
           </a:xfrm>
           <a:prstGeom prst="rect">
             <a:avLst/>
@@ -5490,100 +4607,41 @@
               </a:spcAft>
             </a:pPr>
             <a:r>
-              <a:rPr lang="en-US" altLang="zh-CN" sz="1400" kern="100" dirty="0">
+              <a:rPr lang="zh-CN" sz="1400" kern="100" dirty="0">
                 <a:effectLst/>
                 <a:latin typeface="等线" panose="02010600030101010101" pitchFamily="2" charset="-122"/>
                 <a:ea typeface="等线" panose="02010600030101010101" pitchFamily="2" charset="-122"/>
                 <a:cs typeface="Times New Roman" panose="02020603050405020304" pitchFamily="18" charset="0"/>
               </a:rPr>
-              <a:t>“</a:t>
-            </a:r>
-            <a:r>
-              <a:rPr lang="zh-CN" altLang="en-US" sz="1400" kern="100" dirty="0">
+              <a:t>小节重复次数，</a:t>
+            </a:r>
+            <a:r>
+              <a:rPr lang="en-US" sz="1400" b="1" kern="100" dirty="0">
                 <a:effectLst/>
                 <a:latin typeface="等线" panose="02010600030101010101" pitchFamily="2" charset="-122"/>
                 <a:ea typeface="等线" panose="02010600030101010101" pitchFamily="2" charset="-122"/>
                 <a:cs typeface="Times New Roman" panose="02020603050405020304" pitchFamily="18" charset="0"/>
               </a:rPr>
-              <a:t>重复</a:t>
-            </a:r>
-            <a:r>
-              <a:rPr lang="en-US" altLang="zh-CN" sz="1400" kern="100" dirty="0">
+              <a:t>4bars</a:t>
+            </a:r>
+            <a:r>
+              <a:rPr lang="zh-CN" sz="1400" kern="100" dirty="0">
                 <a:effectLst/>
                 <a:latin typeface="等线" panose="02010600030101010101" pitchFamily="2" charset="-122"/>
                 <a:ea typeface="等线" panose="02010600030101010101" pitchFamily="2" charset="-122"/>
                 <a:cs typeface="Times New Roman" panose="02020603050405020304" pitchFamily="18" charset="0"/>
               </a:rPr>
-              <a:t>”</a:t>
-            </a:r>
-            <a:r>
-              <a:rPr lang="zh-CN" altLang="en-US" sz="1400" kern="100" dirty="0">
-                <a:latin typeface="等线" panose="02010600030101010101" pitchFamily="2" charset="-122"/>
-                <a:ea typeface="等线" panose="02010600030101010101" pitchFamily="2" charset="-122"/>
-                <a:cs typeface="Times New Roman" panose="02020603050405020304" pitchFamily="18" charset="0"/>
-              </a:rPr>
-              <a:t>会在一个小节重复四次同样节奏</a:t>
-            </a:r>
-            <a:endParaRPr lang="en-US" altLang="zh-CN" sz="1400" kern="100" dirty="0">
-              <a:latin typeface="等线" panose="02010600030101010101" pitchFamily="2" charset="-122"/>
-              <a:ea typeface="等线" panose="02010600030101010101" pitchFamily="2" charset="-122"/>
-              <a:cs typeface="Times New Roman" panose="02020603050405020304" pitchFamily="18" charset="0"/>
-            </a:endParaRPr>
-          </a:p>
-          <a:p>
-            <a:pPr algn="just">
-              <a:spcAft>
-                <a:spcPts val="0"/>
-              </a:spcAft>
-            </a:pPr>
-            <a:r>
-              <a:rPr lang="zh-CN" altLang="en-US" sz="1400" kern="100" dirty="0">
-                <a:effectLst/>
-                <a:latin typeface="等线" panose="02010600030101010101" pitchFamily="2" charset="-122"/>
-                <a:ea typeface="等线" panose="02010600030101010101" pitchFamily="2" charset="-122"/>
-                <a:cs typeface="Times New Roman" panose="02020603050405020304" pitchFamily="18" charset="0"/>
-              </a:rPr>
-              <a:t>“随机”会根据</a:t>
-            </a:r>
-            <a:r>
-              <a:rPr lang="zh-CN" altLang="en-US" sz="1400" kern="100" dirty="0">
-                <a:latin typeface="等线" panose="02010600030101010101" pitchFamily="2" charset="-122"/>
-                <a:ea typeface="等线" panose="02010600030101010101" pitchFamily="2" charset="-122"/>
-                <a:cs typeface="Times New Roman" panose="02020603050405020304" pitchFamily="18" charset="0"/>
-              </a:rPr>
-              <a:t>配置随机组合出</a:t>
-            </a:r>
-            <a:r>
-              <a:rPr lang="en-US" altLang="zh-CN" sz="1400" kern="100" dirty="0">
-                <a:latin typeface="等线" panose="02010600030101010101" pitchFamily="2" charset="-122"/>
-                <a:ea typeface="等线" panose="02010600030101010101" pitchFamily="2" charset="-122"/>
-                <a:cs typeface="Times New Roman" panose="02020603050405020304" pitchFamily="18" charset="0"/>
-              </a:rPr>
-              <a:t>100</a:t>
-            </a:r>
-            <a:r>
-              <a:rPr lang="zh-CN" altLang="en-US" sz="1400" kern="100" dirty="0">
-                <a:latin typeface="等线" panose="02010600030101010101" pitchFamily="2" charset="-122"/>
-                <a:ea typeface="等线" panose="02010600030101010101" pitchFamily="2" charset="-122"/>
-                <a:cs typeface="Times New Roman" panose="02020603050405020304" pitchFamily="18" charset="0"/>
-              </a:rPr>
-              <a:t>个小节的练习，每次都不一样</a:t>
-            </a:r>
-            <a:endParaRPr lang="zh-CN" sz="1400" kern="100" dirty="0">
-              <a:effectLst/>
-              <a:latin typeface="等线" panose="02010600030101010101" pitchFamily="2" charset="-122"/>
-              <a:ea typeface="等线" panose="02010600030101010101" pitchFamily="2" charset="-122"/>
-              <a:cs typeface="Times New Roman" panose="02020603050405020304" pitchFamily="18" charset="0"/>
-            </a:endParaRPr>
+              <a:t>就是每条重复四次然后自动进入下一条</a:t>
+            </a:r>
           </a:p>
         </p:txBody>
       </p:sp>
       <p:cxnSp>
         <p:nvCxnSpPr>
-          <p:cNvPr id="6" name="Straight Connector 5">
-            <a:extLst>
-              <a:ext uri="{FF2B5EF4-FFF2-40B4-BE49-F238E27FC236}">
-                <a16:creationId xmlns:a16="http://schemas.microsoft.com/office/drawing/2014/main" id="{C7BEABD6-004E-464C-AB9D-8F0FC1966DA3}"/>
+          <p:cNvPr id="12" name="Straight Connector 11">
+            <a:extLst>
+              <a:ext uri="{FF2B5EF4-FFF2-40B4-BE49-F238E27FC236}">
+                <a16:creationId xmlns:a16="http://schemas.microsoft.com/office/drawing/2014/main" id="{10D4F022-2AD3-4988-BB40-3CD446609122}"/>
               </a:ext>
             </a:extLst>
           </p:cNvPr>
@@ -5594,8 +4652,8 @@
         </p:nvCxnSpPr>
         <p:spPr>
           <a:xfrm>
-            <a:off x="3123432" y="5619274"/>
-            <a:ext cx="3787215" cy="0"/>
+            <a:off x="1516305" y="5630357"/>
+            <a:ext cx="3127739" cy="0"/>
           </a:xfrm>
           <a:prstGeom prst="line">
             <a:avLst/>
@@ -5622,10 +4680,10 @@
       </p:cxnSp>
       <p:cxnSp>
         <p:nvCxnSpPr>
-          <p:cNvPr id="8" name="Straight Arrow Connector 7">
-            <a:extLst>
-              <a:ext uri="{FF2B5EF4-FFF2-40B4-BE49-F238E27FC236}">
-                <a16:creationId xmlns:a16="http://schemas.microsoft.com/office/drawing/2014/main" id="{6267AA51-B208-47D7-8E32-81AA2029D1B9}"/>
+          <p:cNvPr id="17" name="Straight Arrow Connector 16">
+            <a:extLst>
+              <a:ext uri="{FF2B5EF4-FFF2-40B4-BE49-F238E27FC236}">
+                <a16:creationId xmlns:a16="http://schemas.microsoft.com/office/drawing/2014/main" id="{77828EA2-6A3B-4A5B-A2FB-65FD0AE53036}"/>
               </a:ext>
             </a:extLst>
           </p:cNvPr>
@@ -5636,8 +4694,8 @@
         </p:nvCxnSpPr>
         <p:spPr>
           <a:xfrm flipH="1" flipV="1">
-            <a:off x="4834460" y="2549236"/>
-            <a:ext cx="13657" cy="1703678"/>
+            <a:off x="3162492" y="2427316"/>
+            <a:ext cx="17537" cy="2187634"/>
           </a:xfrm>
           <a:prstGeom prst="straightConnector1">
             <a:avLst/>
@@ -5663,10 +4721,10 @@
       </p:cxnSp>
       <p:sp>
         <p:nvSpPr>
-          <p:cNvPr id="9" name="Text Box 11">
-            <a:extLst>
-              <a:ext uri="{FF2B5EF4-FFF2-40B4-BE49-F238E27FC236}">
-                <a16:creationId xmlns:a16="http://schemas.microsoft.com/office/drawing/2014/main" id="{D9C4356B-6DA2-4253-AF04-57B7C3E65454}"/>
+          <p:cNvPr id="18" name="Text Box 11">
+            <a:extLst>
+              <a:ext uri="{FF2B5EF4-FFF2-40B4-BE49-F238E27FC236}">
+                <a16:creationId xmlns:a16="http://schemas.microsoft.com/office/drawing/2014/main" id="{FD5D681D-5E36-4D8B-99D7-F93200631F92}"/>
               </a:ext>
             </a:extLst>
           </p:cNvPr>
@@ -5675,8 +4733,8 @@
         </p:nvSpPr>
         <p:spPr>
           <a:xfrm>
-            <a:off x="4801121" y="3868192"/>
-            <a:ext cx="1965440" cy="451219"/>
+            <a:off x="3133032" y="4294908"/>
+            <a:ext cx="3217891" cy="386539"/>
           </a:xfrm>
           <a:prstGeom prst="rect">
             <a:avLst/>
@@ -5702,12 +4760,19 @@
             </a:pPr>
             <a:r>
               <a:rPr lang="zh-CN" altLang="en-US" sz="1400" kern="100" dirty="0">
-                <a:effectLst/>
                 <a:latin typeface="等线" panose="02010600030101010101" pitchFamily="2" charset="-122"/>
                 <a:ea typeface="等线" panose="02010600030101010101" pitchFamily="2" charset="-122"/>
                 <a:cs typeface="Times New Roman" panose="02020603050405020304" pitchFamily="18" charset="0"/>
               </a:rPr>
-              <a:t>每小节出现几个三连音</a:t>
+              <a:t>速度，每档快</a:t>
+            </a:r>
+            <a:r>
+              <a:rPr lang="en-US" altLang="zh-CN" sz="1400" kern="100" dirty="0">
+                <a:latin typeface="等线" panose="02010600030101010101" pitchFamily="2" charset="-122"/>
+                <a:ea typeface="等线" panose="02010600030101010101" pitchFamily="2" charset="-122"/>
+                <a:cs typeface="Times New Roman" panose="02020603050405020304" pitchFamily="18" charset="0"/>
+              </a:rPr>
+              <a:t>10%</a:t>
             </a:r>
             <a:endParaRPr lang="zh-CN" sz="1400" kern="100" dirty="0">
               <a:effectLst/>
@@ -5720,10 +4785,10 @@
       </p:sp>
       <p:cxnSp>
         <p:nvCxnSpPr>
-          <p:cNvPr id="10" name="Straight Connector 9">
-            <a:extLst>
-              <a:ext uri="{FF2B5EF4-FFF2-40B4-BE49-F238E27FC236}">
-                <a16:creationId xmlns:a16="http://schemas.microsoft.com/office/drawing/2014/main" id="{8EBC86BF-E139-4680-80B1-C6501F1B08D3}"/>
+          <p:cNvPr id="19" name="Straight Connector 18">
+            <a:extLst>
+              <a:ext uri="{FF2B5EF4-FFF2-40B4-BE49-F238E27FC236}">
+                <a16:creationId xmlns:a16="http://schemas.microsoft.com/office/drawing/2014/main" id="{27C9A8E5-29F0-45EF-9000-636F5A290287}"/>
               </a:ext>
             </a:extLst>
           </p:cNvPr>
@@ -5734,8 +4799,8 @@
         </p:nvCxnSpPr>
         <p:spPr>
           <a:xfrm>
-            <a:off x="4835854" y="4252911"/>
-            <a:ext cx="1930707" cy="0"/>
+            <a:off x="3167766" y="4614947"/>
+            <a:ext cx="3127739" cy="0"/>
           </a:xfrm>
           <a:prstGeom prst="line">
             <a:avLst/>
@@ -5762,10 +4827,10 @@
       </p:cxnSp>
       <p:cxnSp>
         <p:nvCxnSpPr>
-          <p:cNvPr id="14" name="Straight Arrow Connector 13">
-            <a:extLst>
-              <a:ext uri="{FF2B5EF4-FFF2-40B4-BE49-F238E27FC236}">
-                <a16:creationId xmlns:a16="http://schemas.microsoft.com/office/drawing/2014/main" id="{239E6A04-3493-402E-A994-2AF554655C9A}"/>
+          <p:cNvPr id="22" name="Straight Arrow Connector 21">
+            <a:extLst>
+              <a:ext uri="{FF2B5EF4-FFF2-40B4-BE49-F238E27FC236}">
+                <a16:creationId xmlns:a16="http://schemas.microsoft.com/office/drawing/2014/main" id="{36978CF2-81ED-472F-B7C2-479FB3366586}"/>
               </a:ext>
             </a:extLst>
           </p:cNvPr>
@@ -5776,8 +4841,8 @@
         </p:nvCxnSpPr>
         <p:spPr>
           <a:xfrm flipH="1" flipV="1">
-            <a:off x="6537376" y="2549236"/>
-            <a:ext cx="9508" cy="1185960"/>
+            <a:off x="4352133" y="2377440"/>
+            <a:ext cx="13846" cy="1727037"/>
           </a:xfrm>
           <a:prstGeom prst="straightConnector1">
             <a:avLst/>
@@ -5803,10 +4868,10 @@
       </p:cxnSp>
       <p:sp>
         <p:nvSpPr>
-          <p:cNvPr id="15" name="Text Box 11">
-            <a:extLst>
-              <a:ext uri="{FF2B5EF4-FFF2-40B4-BE49-F238E27FC236}">
-                <a16:creationId xmlns:a16="http://schemas.microsoft.com/office/drawing/2014/main" id="{66D630D9-A6F4-42A0-87EA-93C1BA4CC393}"/>
+          <p:cNvPr id="23" name="Text Box 11">
+            <a:extLst>
+              <a:ext uri="{FF2B5EF4-FFF2-40B4-BE49-F238E27FC236}">
+                <a16:creationId xmlns:a16="http://schemas.microsoft.com/office/drawing/2014/main" id="{1506E43E-50C1-4D7A-A342-B2AC6E97C2F3}"/>
               </a:ext>
             </a:extLst>
           </p:cNvPr>
@@ -5815,8 +4880,8 @@
         </p:nvSpPr>
         <p:spPr>
           <a:xfrm>
-            <a:off x="6499886" y="3350474"/>
-            <a:ext cx="2519619" cy="451219"/>
+            <a:off x="4318981" y="3558281"/>
+            <a:ext cx="3217891" cy="612694"/>
           </a:xfrm>
           <a:prstGeom prst="rect">
             <a:avLst/>
@@ -5847,23 +4912,7 @@
                 <a:ea typeface="等线" panose="02010600030101010101" pitchFamily="2" charset="-122"/>
                 <a:cs typeface="Times New Roman" panose="02020603050405020304" pitchFamily="18" charset="0"/>
               </a:rPr>
-              <a:t>选择之后只出现</a:t>
-            </a:r>
-            <a:r>
-              <a:rPr lang="en-US" altLang="zh-CN" sz="1400" kern="100" dirty="0">
-                <a:latin typeface="等线" panose="02010600030101010101" pitchFamily="2" charset="-122"/>
-                <a:ea typeface="等线" panose="02010600030101010101" pitchFamily="2" charset="-122"/>
-                <a:cs typeface="Times New Roman" panose="02020603050405020304" pitchFamily="18" charset="0"/>
-              </a:rPr>
-              <a:t>1/16</a:t>
-            </a:r>
-            <a:r>
-              <a:rPr lang="zh-CN" altLang="en-US" sz="1400" kern="100" dirty="0">
-                <a:latin typeface="等线" panose="02010600030101010101" pitchFamily="2" charset="-122"/>
-                <a:ea typeface="等线" panose="02010600030101010101" pitchFamily="2" charset="-122"/>
-                <a:cs typeface="Times New Roman" panose="02020603050405020304" pitchFamily="18" charset="0"/>
-              </a:rPr>
-              <a:t>音符</a:t>
+              <a:t>节拍器指示，选不同的位置可以选择重音在第几拍</a:t>
             </a:r>
             <a:endParaRPr lang="zh-CN" sz="1400" kern="100" dirty="0">
               <a:effectLst/>
@@ -5876,10 +4925,10 @@
       </p:sp>
       <p:cxnSp>
         <p:nvCxnSpPr>
-          <p:cNvPr id="16" name="Straight Connector 15">
-            <a:extLst>
-              <a:ext uri="{FF2B5EF4-FFF2-40B4-BE49-F238E27FC236}">
-                <a16:creationId xmlns:a16="http://schemas.microsoft.com/office/drawing/2014/main" id="{8EFF288D-00A4-4020-A19B-0C5D0F07BE99}"/>
+          <p:cNvPr id="24" name="Straight Connector 23">
+            <a:extLst>
+              <a:ext uri="{FF2B5EF4-FFF2-40B4-BE49-F238E27FC236}">
+                <a16:creationId xmlns:a16="http://schemas.microsoft.com/office/drawing/2014/main" id="{C3AE9FE3-E92B-479F-BAD6-0766C5E600A9}"/>
               </a:ext>
             </a:extLst>
           </p:cNvPr>
@@ -5890,8 +4939,8 @@
         </p:nvCxnSpPr>
         <p:spPr>
           <a:xfrm>
-            <a:off x="6534620" y="3735193"/>
-            <a:ext cx="2675882" cy="0"/>
+            <a:off x="4353715" y="4104474"/>
+            <a:ext cx="3127739" cy="0"/>
           </a:xfrm>
           <a:prstGeom prst="line">
             <a:avLst/>
@@ -5918,10 +4967,10 @@
       </p:cxnSp>
       <p:cxnSp>
         <p:nvCxnSpPr>
-          <p:cNvPr id="20" name="Straight Arrow Connector 19">
-            <a:extLst>
-              <a:ext uri="{FF2B5EF4-FFF2-40B4-BE49-F238E27FC236}">
-                <a16:creationId xmlns:a16="http://schemas.microsoft.com/office/drawing/2014/main" id="{6896B466-315E-4128-B7D3-284D6821BEB1}"/>
+          <p:cNvPr id="27" name="Straight Arrow Connector 26">
+            <a:extLst>
+              <a:ext uri="{FF2B5EF4-FFF2-40B4-BE49-F238E27FC236}">
+                <a16:creationId xmlns:a16="http://schemas.microsoft.com/office/drawing/2014/main" id="{D9950E74-0C00-432A-B533-43C34DCDA309}"/>
               </a:ext>
             </a:extLst>
           </p:cNvPr>
@@ -5931,9 +4980,9 @@
           <p:nvPr/>
         </p:nvCxnSpPr>
         <p:spPr>
-          <a:xfrm flipV="1">
-            <a:off x="8120760" y="2531886"/>
-            <a:ext cx="0" cy="685592"/>
+          <a:xfrm flipH="1" flipV="1">
+            <a:off x="6634167" y="2305396"/>
+            <a:ext cx="8697" cy="1084817"/>
           </a:xfrm>
           <a:prstGeom prst="straightConnector1">
             <a:avLst/>
@@ -5959,10 +5008,10 @@
       </p:cxnSp>
       <p:sp>
         <p:nvSpPr>
-          <p:cNvPr id="21" name="Text Box 11">
-            <a:extLst>
-              <a:ext uri="{FF2B5EF4-FFF2-40B4-BE49-F238E27FC236}">
-                <a16:creationId xmlns:a16="http://schemas.microsoft.com/office/drawing/2014/main" id="{3EE70722-AD1D-492E-A645-20F1B560A09B}"/>
+          <p:cNvPr id="28" name="Text Box 11">
+            <a:extLst>
+              <a:ext uri="{FF2B5EF4-FFF2-40B4-BE49-F238E27FC236}">
+                <a16:creationId xmlns:a16="http://schemas.microsoft.com/office/drawing/2014/main" id="{662B9F85-56C3-4E59-8BFA-B04C6EFB5C9E}"/>
               </a:ext>
             </a:extLst>
           </p:cNvPr>
@@ -5971,8 +5020,8 @@
         </p:nvSpPr>
         <p:spPr>
           <a:xfrm>
-            <a:off x="8073762" y="2832756"/>
-            <a:ext cx="2519619" cy="451219"/>
+            <a:off x="6595866" y="2844016"/>
+            <a:ext cx="3217891" cy="612694"/>
           </a:xfrm>
           <a:prstGeom prst="rect">
             <a:avLst/>
@@ -6003,7 +5052,7 @@
                 <a:ea typeface="等线" panose="02010600030101010101" pitchFamily="2" charset="-122"/>
                 <a:cs typeface="Times New Roman" panose="02020603050405020304" pitchFamily="18" charset="0"/>
               </a:rPr>
-              <a:t>选择之后会</a:t>
+              <a:t>节拍选择</a:t>
             </a:r>
             <a:r>
               <a:rPr lang="zh-CN" altLang="en-US" sz="1400" kern="100" dirty="0">
@@ -6011,7 +5060,39 @@
                 <a:ea typeface="等线" panose="02010600030101010101" pitchFamily="2" charset="-122"/>
                 <a:cs typeface="Times New Roman" panose="02020603050405020304" pitchFamily="18" charset="0"/>
               </a:rPr>
-              <a:t>在偶数拍插入休止</a:t>
+              <a:t>，默认节拍器打</a:t>
+            </a:r>
+            <a:r>
+              <a:rPr lang="en-US" altLang="zh-CN" sz="1400" kern="100" dirty="0">
+                <a:latin typeface="等线" panose="02010600030101010101" pitchFamily="2" charset="-122"/>
+                <a:ea typeface="等线" panose="02010600030101010101" pitchFamily="2" charset="-122"/>
+                <a:cs typeface="Times New Roman" panose="02020603050405020304" pitchFamily="18" charset="0"/>
+              </a:rPr>
+              <a:t>1/4</a:t>
+            </a:r>
+            <a:r>
+              <a:rPr lang="zh-CN" altLang="en-US" sz="1400" kern="100" dirty="0">
+                <a:latin typeface="等线" panose="02010600030101010101" pitchFamily="2" charset="-122"/>
+                <a:ea typeface="等线" panose="02010600030101010101" pitchFamily="2" charset="-122"/>
+                <a:cs typeface="Times New Roman" panose="02020603050405020304" pitchFamily="18" charset="0"/>
+              </a:rPr>
+              <a:t>拍，勾选之后节拍器打</a:t>
+            </a:r>
+            <a:r>
+              <a:rPr lang="en-US" altLang="zh-CN" sz="1400" kern="100" dirty="0">
+                <a:latin typeface="等线" panose="02010600030101010101" pitchFamily="2" charset="-122"/>
+                <a:ea typeface="等线" panose="02010600030101010101" pitchFamily="2" charset="-122"/>
+                <a:cs typeface="Times New Roman" panose="02020603050405020304" pitchFamily="18" charset="0"/>
+              </a:rPr>
+              <a:t>1/16</a:t>
+            </a:r>
+            <a:r>
+              <a:rPr lang="zh-CN" altLang="en-US" sz="1400" kern="100" dirty="0">
+                <a:latin typeface="等线" panose="02010600030101010101" pitchFamily="2" charset="-122"/>
+                <a:ea typeface="等线" panose="02010600030101010101" pitchFamily="2" charset="-122"/>
+                <a:cs typeface="Times New Roman" panose="02020603050405020304" pitchFamily="18" charset="0"/>
+              </a:rPr>
+              <a:t>拍</a:t>
             </a:r>
             <a:endParaRPr lang="zh-CN" sz="1400" kern="100" dirty="0">
               <a:effectLst/>
@@ -6024,10 +5105,10 @@
       </p:sp>
       <p:cxnSp>
         <p:nvCxnSpPr>
-          <p:cNvPr id="22" name="Straight Connector 21">
-            <a:extLst>
-              <a:ext uri="{FF2B5EF4-FFF2-40B4-BE49-F238E27FC236}">
-                <a16:creationId xmlns:a16="http://schemas.microsoft.com/office/drawing/2014/main" id="{AD087E05-2B65-4D6B-9AA2-6E43F87FA254}"/>
+          <p:cNvPr id="29" name="Straight Connector 28">
+            <a:extLst>
+              <a:ext uri="{FF2B5EF4-FFF2-40B4-BE49-F238E27FC236}">
+                <a16:creationId xmlns:a16="http://schemas.microsoft.com/office/drawing/2014/main" id="{4283E841-CEEA-49B3-9F01-981F8ABF7BA6}"/>
               </a:ext>
             </a:extLst>
           </p:cNvPr>
@@ -6038,8 +5119,8 @@
         </p:nvCxnSpPr>
         <p:spPr>
           <a:xfrm>
-            <a:off x="8108496" y="3217475"/>
-            <a:ext cx="2675882" cy="0"/>
+            <a:off x="6630600" y="3390209"/>
+            <a:ext cx="3100833" cy="0"/>
           </a:xfrm>
           <a:prstGeom prst="line">
             <a:avLst/>
@@ -6066,10 +5147,10 @@
       </p:cxnSp>
       <p:cxnSp>
         <p:nvCxnSpPr>
-          <p:cNvPr id="25" name="Straight Arrow Connector 24">
-            <a:extLst>
-              <a:ext uri="{FF2B5EF4-FFF2-40B4-BE49-F238E27FC236}">
-                <a16:creationId xmlns:a16="http://schemas.microsoft.com/office/drawing/2014/main" id="{60A72898-DC43-423B-ADEF-1155065DB415}"/>
+          <p:cNvPr id="34" name="Straight Arrow Connector 33">
+            <a:extLst>
+              <a:ext uri="{FF2B5EF4-FFF2-40B4-BE49-F238E27FC236}">
+                <a16:creationId xmlns:a16="http://schemas.microsoft.com/office/drawing/2014/main" id="{3BE0A191-2EBB-4454-AC92-4F3F7F1462DF}"/>
               </a:ext>
             </a:extLst>
           </p:cNvPr>
@@ -6080,7 +5161,7 @@
         </p:nvCxnSpPr>
         <p:spPr>
           <a:xfrm flipH="1">
-            <a:off x="10150835" y="1281770"/>
+            <a:off x="8693337" y="1277765"/>
             <a:ext cx="1" cy="557268"/>
           </a:xfrm>
           <a:prstGeom prst="straightConnector1">
@@ -6107,10 +5188,10 @@
       </p:cxnSp>
       <p:sp>
         <p:nvSpPr>
-          <p:cNvPr id="26" name="Text Box 11">
-            <a:extLst>
-              <a:ext uri="{FF2B5EF4-FFF2-40B4-BE49-F238E27FC236}">
-                <a16:creationId xmlns:a16="http://schemas.microsoft.com/office/drawing/2014/main" id="{A9CF3A41-3D10-4E1A-A696-541D5576B14A}"/>
+          <p:cNvPr id="35" name="Text Box 11">
+            <a:extLst>
+              <a:ext uri="{FF2B5EF4-FFF2-40B4-BE49-F238E27FC236}">
+                <a16:creationId xmlns:a16="http://schemas.microsoft.com/office/drawing/2014/main" id="{4B904B8A-B999-466D-A8A8-8CE76696550B}"/>
               </a:ext>
             </a:extLst>
           </p:cNvPr>
@@ -6119,8 +5200,8 @@
         </p:nvSpPr>
         <p:spPr>
           <a:xfrm>
-            <a:off x="6590324" y="886690"/>
-            <a:ext cx="3217891" cy="461575"/>
+            <a:off x="5132826" y="731567"/>
+            <a:ext cx="3217891" cy="612694"/>
           </a:xfrm>
           <a:prstGeom prst="rect">
             <a:avLst/>
@@ -6150,7 +5231,7 @@
                 <a:ea typeface="等线" panose="02010600030101010101" pitchFamily="2" charset="-122"/>
                 <a:cs typeface="Times New Roman" panose="02020603050405020304" pitchFamily="18" charset="0"/>
               </a:rPr>
-              <a:t>勾选之后在三连音拍里面插入休止</a:t>
+              <a:t>勾选之后会把节奏型用钢琴的声音播放出来，很有用！</a:t>
             </a:r>
             <a:endParaRPr lang="zh-CN" sz="1400" kern="100" dirty="0">
               <a:effectLst/>
@@ -6163,10 +5244,10 @@
       </p:sp>
       <p:cxnSp>
         <p:nvCxnSpPr>
-          <p:cNvPr id="27" name="Straight Connector 26">
-            <a:extLst>
-              <a:ext uri="{FF2B5EF4-FFF2-40B4-BE49-F238E27FC236}">
-                <a16:creationId xmlns:a16="http://schemas.microsoft.com/office/drawing/2014/main" id="{6D8C377B-5B16-49C2-A7E3-C8CAC671357E}"/>
+          <p:cNvPr id="36" name="Straight Connector 35">
+            <a:extLst>
+              <a:ext uri="{FF2B5EF4-FFF2-40B4-BE49-F238E27FC236}">
+                <a16:creationId xmlns:a16="http://schemas.microsoft.com/office/drawing/2014/main" id="{D5217038-8608-428C-ADB4-866D07B983B7}"/>
               </a:ext>
             </a:extLst>
           </p:cNvPr>
@@ -6177,7 +5258,7 @@
         </p:nvCxnSpPr>
         <p:spPr>
           <a:xfrm>
-            <a:off x="6625058" y="1281765"/>
+            <a:off x="5167560" y="1277760"/>
             <a:ext cx="3525777" cy="0"/>
           </a:xfrm>
           <a:prstGeom prst="line">
@@ -6203,64 +5284,258 @@
           </a:fontRef>
         </p:style>
       </p:cxnSp>
-      <p:sp>
-        <p:nvSpPr>
-          <p:cNvPr id="28" name="Title 1">
-            <a:extLst>
-              <a:ext uri="{FF2B5EF4-FFF2-40B4-BE49-F238E27FC236}">
-                <a16:creationId xmlns:a16="http://schemas.microsoft.com/office/drawing/2014/main" id="{4092B6D9-0890-460D-9581-826563972ED7}"/>
-              </a:ext>
-            </a:extLst>
-          </p:cNvPr>
-          <p:cNvSpPr txBox="1">
-            <a:spLocks/>
-          </p:cNvSpPr>
+      <p:cxnSp>
+        <p:nvCxnSpPr>
+          <p:cNvPr id="39" name="Straight Arrow Connector 38">
+            <a:extLst>
+              <a:ext uri="{FF2B5EF4-FFF2-40B4-BE49-F238E27FC236}">
+                <a16:creationId xmlns:a16="http://schemas.microsoft.com/office/drawing/2014/main" id="{B45A083E-43DE-4ABD-B6A5-A9300661BD93}"/>
+              </a:ext>
+            </a:extLst>
+          </p:cNvPr>
+          <p:cNvCxnSpPr>
+            <a:cxnSpLocks/>
+          </p:cNvCxnSpPr>
+          <p:nvPr/>
+        </p:nvCxnSpPr>
+        <p:spPr>
+          <a:xfrm flipH="1">
+            <a:off x="10355883" y="630001"/>
+            <a:ext cx="1" cy="1071862"/>
+          </a:xfrm>
+          <a:prstGeom prst="straightConnector1">
+            <a:avLst/>
+          </a:prstGeom>
+          <a:ln w="28575">
+            <a:tailEnd type="triangle"/>
+          </a:ln>
+        </p:spPr>
+        <p:style>
+          <a:lnRef idx="1">
+            <a:schemeClr val="accent1"/>
+          </a:lnRef>
+          <a:fillRef idx="0">
+            <a:schemeClr val="accent1"/>
+          </a:fillRef>
+          <a:effectRef idx="0">
+            <a:schemeClr val="accent1"/>
+          </a:effectRef>
+          <a:fontRef idx="minor">
+            <a:schemeClr val="tx1"/>
+          </a:fontRef>
+        </p:style>
+      </p:cxnSp>
+      <p:sp>
+        <p:nvSpPr>
+          <p:cNvPr id="40" name="Text Box 11">
+            <a:extLst>
+              <a:ext uri="{FF2B5EF4-FFF2-40B4-BE49-F238E27FC236}">
+                <a16:creationId xmlns:a16="http://schemas.microsoft.com/office/drawing/2014/main" id="{C76602E1-E421-4D52-B082-8E7232B7417F}"/>
+              </a:ext>
+            </a:extLst>
+          </p:cNvPr>
+          <p:cNvSpPr txBox="1"/>
           <p:nvPr/>
         </p:nvSpPr>
         <p:spPr>
           <a:xfrm>
-            <a:off x="566651" y="6039240"/>
-            <a:ext cx="10515600" cy="818760"/>
+            <a:off x="6795371" y="83803"/>
+            <a:ext cx="3217891" cy="612694"/>
           </a:xfrm>
           <a:prstGeom prst="rect">
             <a:avLst/>
           </a:prstGeom>
-        </p:spPr>
-        <p:txBody>
-          <a:bodyPr vert="horz" lIns="91440" tIns="45720" rIns="91440" bIns="45720" rtlCol="0" anchor="ctr">
-            <a:normAutofit/>
+          <a:noFill/>
+          <a:ln w="6350">
+            <a:noFill/>
+          </a:ln>
+        </p:spPr>
+        <p:txBody>
+          <a:bodyPr rot="0" spcFirstLastPara="0" vert="horz" wrap="square" lIns="91440" tIns="45720" rIns="91440" bIns="45720" numCol="1" spcCol="0" rtlCol="0" fromWordArt="0" anchor="t" anchorCtr="0" forceAA="0" compatLnSpc="1">
+            <a:prstTxWarp prst="textNoShape">
+              <a:avLst/>
+            </a:prstTxWarp>
+            <a:noAutofit/>
           </a:bodyPr>
-          <a:lstStyle>
-            <a:lvl1pPr algn="l" defTabSz="914400" rtl="0" eaLnBrk="1" latinLnBrk="0" hangingPunct="1">
-              <a:lnSpc>
-                <a:spcPct val="90000"/>
-              </a:lnSpc>
-              <a:spcBef>
-                <a:spcPct val="0"/>
-              </a:spcBef>
-              <a:buNone/>
-              <a:defRPr sz="4400" kern="1200">
-                <a:solidFill>
-                  <a:schemeClr val="tx1"/>
-                </a:solidFill>
-                <a:latin typeface="+mj-lt"/>
-                <a:ea typeface="+mj-ea"/>
-                <a:cs typeface="+mj-cs"/>
-              </a:defRPr>
-            </a:lvl1pPr>
-          </a:lstStyle>
-          <a:p>
-            <a:r>
-              <a:rPr lang="zh-CN" altLang="en-US" sz="2800" dirty="0"/>
-              <a:t>下面几页有一些不同难度的组合给大家参考</a:t>
-            </a:r>
+          <a:lstStyle/>
+          <a:p>
+            <a:pPr algn="just">
+              <a:spcAft>
+                <a:spcPts val="0"/>
+              </a:spcAft>
+            </a:pPr>
+            <a:r>
+              <a:rPr lang="zh-CN" altLang="en-US" sz="1400" kern="100" dirty="0">
+                <a:effectLst/>
+                <a:latin typeface="等线" panose="02010600030101010101" pitchFamily="2" charset="-122"/>
+                <a:ea typeface="等线" panose="02010600030101010101" pitchFamily="2" charset="-122"/>
+                <a:cs typeface="Times New Roman" panose="02020603050405020304" pitchFamily="18" charset="0"/>
+              </a:rPr>
+              <a:t>不选的话每次换新的小节之前会有四拍准备，勾选之后直接进入播放</a:t>
+            </a:r>
+            <a:endParaRPr lang="zh-CN" sz="1400" kern="100" dirty="0">
+              <a:effectLst/>
+              <a:latin typeface="等线" panose="02010600030101010101" pitchFamily="2" charset="-122"/>
+              <a:ea typeface="等线" panose="02010600030101010101" pitchFamily="2" charset="-122"/>
+              <a:cs typeface="Times New Roman" panose="02020603050405020304" pitchFamily="18" charset="0"/>
+            </a:endParaRPr>
+          </a:p>
+        </p:txBody>
+      </p:sp>
+      <p:cxnSp>
+        <p:nvCxnSpPr>
+          <p:cNvPr id="41" name="Straight Connector 40">
+            <a:extLst>
+              <a:ext uri="{FF2B5EF4-FFF2-40B4-BE49-F238E27FC236}">
+                <a16:creationId xmlns:a16="http://schemas.microsoft.com/office/drawing/2014/main" id="{DDBFCDF0-6954-405B-AC3B-9E13E6FCE23E}"/>
+              </a:ext>
+            </a:extLst>
+          </p:cNvPr>
+          <p:cNvCxnSpPr>
+            <a:cxnSpLocks/>
+          </p:cNvCxnSpPr>
+          <p:nvPr/>
+        </p:nvCxnSpPr>
+        <p:spPr>
+          <a:xfrm>
+            <a:off x="6830105" y="629996"/>
+            <a:ext cx="3525777" cy="0"/>
+          </a:xfrm>
+          <a:prstGeom prst="line">
+            <a:avLst/>
+          </a:prstGeom>
+          <a:ln w="28575">
+            <a:headEnd type="none" w="med" len="med"/>
+            <a:tailEnd type="none" w="med" len="med"/>
+          </a:ln>
+        </p:spPr>
+        <p:style>
+          <a:lnRef idx="1">
+            <a:schemeClr val="accent1"/>
+          </a:lnRef>
+          <a:fillRef idx="0">
+            <a:schemeClr val="accent1"/>
+          </a:fillRef>
+          <a:effectRef idx="0">
+            <a:schemeClr val="accent1"/>
+          </a:effectRef>
+          <a:fontRef idx="minor">
+            <a:schemeClr val="tx1"/>
+          </a:fontRef>
+        </p:style>
+      </p:cxnSp>
+      <p:sp>
+        <p:nvSpPr>
+          <p:cNvPr id="44" name="Text Box 11">
+            <a:extLst>
+              <a:ext uri="{FF2B5EF4-FFF2-40B4-BE49-F238E27FC236}">
+                <a16:creationId xmlns:a16="http://schemas.microsoft.com/office/drawing/2014/main" id="{64B972C1-5A57-40CD-9933-BDB5DD611612}"/>
+              </a:ext>
+            </a:extLst>
+          </p:cNvPr>
+          <p:cNvSpPr txBox="1"/>
+          <p:nvPr/>
+        </p:nvSpPr>
+        <p:spPr>
+          <a:xfrm>
+            <a:off x="6815428" y="4717843"/>
+            <a:ext cx="3968950" cy="1510155"/>
+          </a:xfrm>
+          <a:prstGeom prst="rect">
+            <a:avLst/>
+          </a:prstGeom>
+          <a:noFill/>
+          <a:ln w="6350">
+            <a:noFill/>
+          </a:ln>
+        </p:spPr>
+        <p:txBody>
+          <a:bodyPr rot="0" spcFirstLastPara="0" vert="horz" wrap="square" lIns="91440" tIns="45720" rIns="91440" bIns="45720" numCol="1" spcCol="0" rtlCol="0" fromWordArt="0" anchor="t" anchorCtr="0" forceAA="0" compatLnSpc="1">
+            <a:prstTxWarp prst="textNoShape">
+              <a:avLst/>
+            </a:prstTxWarp>
+            <a:noAutofit/>
+          </a:bodyPr>
+          <a:lstStyle/>
+          <a:p>
+            <a:pPr algn="just">
+              <a:spcAft>
+                <a:spcPts val="0"/>
+              </a:spcAft>
+            </a:pPr>
+            <a:r>
+              <a:rPr lang="zh-CN" altLang="en-US" sz="1400" kern="100" dirty="0">
+                <a:effectLst/>
+                <a:latin typeface="等线" panose="02010600030101010101" pitchFamily="2" charset="-122"/>
+                <a:ea typeface="等线" panose="02010600030101010101" pitchFamily="2" charset="-122"/>
+                <a:cs typeface="Times New Roman" panose="02020603050405020304" pitchFamily="18" charset="0"/>
+              </a:rPr>
+              <a:t>节拍器会有三种声音：</a:t>
+            </a:r>
+            <a:endParaRPr lang="en-US" altLang="zh-CN" sz="1400" kern="100" dirty="0">
+              <a:effectLst/>
+              <a:latin typeface="等线" panose="02010600030101010101" pitchFamily="2" charset="-122"/>
+              <a:ea typeface="等线" panose="02010600030101010101" pitchFamily="2" charset="-122"/>
+              <a:cs typeface="Times New Roman" panose="02020603050405020304" pitchFamily="18" charset="0"/>
+            </a:endParaRPr>
+          </a:p>
+          <a:p>
+            <a:pPr algn="just">
+              <a:spcAft>
+                <a:spcPts val="0"/>
+              </a:spcAft>
+            </a:pPr>
+            <a:r>
+              <a:rPr lang="zh-CN" altLang="en-US" sz="1400" kern="100" dirty="0">
+                <a:latin typeface="等线" panose="02010600030101010101" pitchFamily="2" charset="-122"/>
+                <a:cs typeface="Times New Roman" panose="02020603050405020304" pitchFamily="18" charset="0"/>
+              </a:rPr>
+              <a:t>“咚咚咚咚”</a:t>
+            </a:r>
+            <a:r>
+              <a:rPr lang="zh-CN" altLang="en-US" sz="1400" kern="100" dirty="0">
+                <a:effectLst/>
+                <a:latin typeface="等线" panose="02010600030101010101" pitchFamily="2" charset="-122"/>
+                <a:ea typeface="等线" panose="02010600030101010101" pitchFamily="2" charset="-122"/>
+                <a:cs typeface="Times New Roman" panose="02020603050405020304" pitchFamily="18" charset="0"/>
+              </a:rPr>
+              <a:t>是准备拍</a:t>
+            </a:r>
+            <a:endParaRPr lang="en-US" altLang="zh-CN" sz="1400" kern="100" dirty="0">
+              <a:effectLst/>
+              <a:latin typeface="等线" panose="02010600030101010101" pitchFamily="2" charset="-122"/>
+              <a:ea typeface="等线" panose="02010600030101010101" pitchFamily="2" charset="-122"/>
+              <a:cs typeface="Times New Roman" panose="02020603050405020304" pitchFamily="18" charset="0"/>
+            </a:endParaRPr>
+          </a:p>
+          <a:p>
+            <a:pPr algn="just">
+              <a:spcAft>
+                <a:spcPts val="0"/>
+              </a:spcAft>
+            </a:pPr>
+            <a:r>
+              <a:rPr lang="zh-CN" altLang="en-US" sz="1400" kern="100" dirty="0">
+                <a:effectLst/>
+                <a:latin typeface="等线" panose="02010600030101010101" pitchFamily="2" charset="-122"/>
+                <a:ea typeface="等线" panose="02010600030101010101" pitchFamily="2" charset="-122"/>
+                <a:cs typeface="Times New Roman" panose="02020603050405020304" pitchFamily="18" charset="0"/>
+              </a:rPr>
+              <a:t>之后“滴”是强拍，“嗒”是弱拍</a:t>
+            </a:r>
+            <a:endParaRPr lang="zh-CN" sz="1400" kern="100" dirty="0">
+              <a:effectLst/>
+              <a:latin typeface="等线" panose="02010600030101010101" pitchFamily="2" charset="-122"/>
+              <a:ea typeface="等线" panose="02010600030101010101" pitchFamily="2" charset="-122"/>
+              <a:cs typeface="Times New Roman" panose="02020603050405020304" pitchFamily="18" charset="0"/>
+            </a:endParaRPr>
           </a:p>
         </p:txBody>
       </p:sp>
     </p:spTree>
     <p:extLst>
       <p:ext uri="{BB962C8B-B14F-4D97-AF65-F5344CB8AC3E}">
-        <p14:creationId xmlns:p14="http://schemas.microsoft.com/office/powerpoint/2010/main" val="3919112610"/>
+        <p14:creationId xmlns:p14="http://schemas.microsoft.com/office/powerpoint/2010/main" val="270918078"/>
       </p:ext>
     </p:extLst>
   </p:cSld>
@@ -6289,10 +5564,10 @@
       </p:grpSpPr>
       <p:sp>
         <p:nvSpPr>
-          <p:cNvPr id="3" name="Title 2">
-            <a:extLst>
-              <a:ext uri="{FF2B5EF4-FFF2-40B4-BE49-F238E27FC236}">
-                <a16:creationId xmlns:a16="http://schemas.microsoft.com/office/drawing/2014/main" id="{F2E17C7D-6781-4541-8B98-B03729B02C8E}"/>
+          <p:cNvPr id="2" name="Title 1">
+            <a:extLst>
+              <a:ext uri="{FF2B5EF4-FFF2-40B4-BE49-F238E27FC236}">
+                <a16:creationId xmlns:a16="http://schemas.microsoft.com/office/drawing/2014/main" id="{E2EAB8F1-FE5C-4C0F-8F46-F694F16FB1A2}"/>
               </a:ext>
             </a:extLst>
           </p:cNvPr>
@@ -6310,25 +5585,17 @@
           <a:p>
             <a:r>
               <a:rPr lang="zh-CN" altLang="en-US" dirty="0"/>
-              <a:t>在</a:t>
-            </a:r>
-            <a:r>
-              <a:rPr lang="en-US" altLang="zh-CN" dirty="0"/>
-              <a:t>16</a:t>
-            </a:r>
-            <a:r>
-              <a:rPr lang="zh-CN" altLang="en-US" dirty="0"/>
-              <a:t>分的不同位置练习休止（重复和随机）</a:t>
+              <a:t>节奏型控制</a:t>
             </a:r>
           </a:p>
         </p:txBody>
       </p:sp>
       <p:pic>
         <p:nvPicPr>
-          <p:cNvPr id="4" name="Picture 3">
-            <a:extLst>
-              <a:ext uri="{FF2B5EF4-FFF2-40B4-BE49-F238E27FC236}">
-                <a16:creationId xmlns:a16="http://schemas.microsoft.com/office/drawing/2014/main" id="{11B95BA1-9C18-4EC8-A457-A9D49D7C9D80}"/>
+          <p:cNvPr id="3" name="Picture 2">
+            <a:extLst>
+              <a:ext uri="{FF2B5EF4-FFF2-40B4-BE49-F238E27FC236}">
+                <a16:creationId xmlns:a16="http://schemas.microsoft.com/office/drawing/2014/main" id="{F46406C0-13DE-4CC3-88DE-7638394977FE}"/>
               </a:ext>
             </a:extLst>
           </p:cNvPr>
@@ -6345,48 +5612,866 @@
         </p:blipFill>
         <p:spPr>
           <a:xfrm>
-            <a:off x="87099" y="1769533"/>
-            <a:ext cx="6401618" cy="3783542"/>
+            <a:off x="838200" y="1690688"/>
+            <a:ext cx="10515600" cy="914400"/>
           </a:xfrm>
           <a:prstGeom prst="rect">
             <a:avLst/>
           </a:prstGeom>
         </p:spPr>
       </p:pic>
-      <p:pic>
-        <p:nvPicPr>
-          <p:cNvPr id="5" name="Picture 4">
-            <a:extLst>
-              <a:ext uri="{FF2B5EF4-FFF2-40B4-BE49-F238E27FC236}">
-                <a16:creationId xmlns:a16="http://schemas.microsoft.com/office/drawing/2014/main" id="{F54780FF-D191-47B9-82A3-91CDEB904C52}"/>
-              </a:ext>
-            </a:extLst>
-          </p:cNvPr>
-          <p:cNvPicPr>
-            <a:picLocks noChangeAspect="1"/>
-          </p:cNvPicPr>
+      <p:cxnSp>
+        <p:nvCxnSpPr>
+          <p:cNvPr id="4" name="Straight Arrow Connector 3">
+            <a:extLst>
+              <a:ext uri="{FF2B5EF4-FFF2-40B4-BE49-F238E27FC236}">
+                <a16:creationId xmlns:a16="http://schemas.microsoft.com/office/drawing/2014/main" id="{B44E9C1A-E3F8-4653-8EBD-9C19DE439255}"/>
+              </a:ext>
+            </a:extLst>
+          </p:cNvPr>
+          <p:cNvCxnSpPr>
+            <a:cxnSpLocks/>
+          </p:cNvCxnSpPr>
           <p:nvPr/>
-        </p:nvPicPr>
-        <p:blipFill>
-          <a:blip r:embed="rId3"/>
-          <a:stretch>
-            <a:fillRect/>
-          </a:stretch>
-        </p:blipFill>
+        </p:nvCxnSpPr>
+        <p:spPr>
+          <a:xfrm flipH="1" flipV="1">
+            <a:off x="3109619" y="2366357"/>
+            <a:ext cx="26075" cy="3252919"/>
+          </a:xfrm>
+          <a:prstGeom prst="straightConnector1">
+            <a:avLst/>
+          </a:prstGeom>
+          <a:ln w="28575">
+            <a:tailEnd type="triangle"/>
+          </a:ln>
+        </p:spPr>
+        <p:style>
+          <a:lnRef idx="1">
+            <a:schemeClr val="accent1"/>
+          </a:lnRef>
+          <a:fillRef idx="0">
+            <a:schemeClr val="accent1"/>
+          </a:fillRef>
+          <a:effectRef idx="0">
+            <a:schemeClr val="accent1"/>
+          </a:effectRef>
+          <a:fontRef idx="minor">
+            <a:schemeClr val="tx1"/>
+          </a:fontRef>
+        </p:style>
+      </p:cxnSp>
+      <p:sp>
+        <p:nvSpPr>
+          <p:cNvPr id="5" name="Text Box 11">
+            <a:extLst>
+              <a:ext uri="{FF2B5EF4-FFF2-40B4-BE49-F238E27FC236}">
+                <a16:creationId xmlns:a16="http://schemas.microsoft.com/office/drawing/2014/main" id="{45C4A0FB-0954-4272-BEC0-7834212BD7FE}"/>
+              </a:ext>
+            </a:extLst>
+          </p:cNvPr>
+          <p:cNvSpPr txBox="1"/>
+          <p:nvPr/>
+        </p:nvSpPr>
         <p:spPr>
           <a:xfrm>
-            <a:off x="6093670" y="1888595"/>
-            <a:ext cx="6098330" cy="3545417"/>
+            <a:off x="3088697" y="5059679"/>
+            <a:ext cx="5296073" cy="626095"/>
           </a:xfrm>
           <a:prstGeom prst="rect">
             <a:avLst/>
           </a:prstGeom>
-        </p:spPr>
-      </p:pic>
+          <a:noFill/>
+          <a:ln w="6350">
+            <a:noFill/>
+          </a:ln>
+        </p:spPr>
+        <p:txBody>
+          <a:bodyPr rot="0" spcFirstLastPara="0" vert="horz" wrap="square" lIns="91440" tIns="45720" rIns="91440" bIns="45720" numCol="1" spcCol="0" rtlCol="0" fromWordArt="0" anchor="t" anchorCtr="0" forceAA="0" compatLnSpc="1">
+            <a:prstTxWarp prst="textNoShape">
+              <a:avLst/>
+            </a:prstTxWarp>
+            <a:noAutofit/>
+          </a:bodyPr>
+          <a:lstStyle/>
+          <a:p>
+            <a:pPr algn="just">
+              <a:spcAft>
+                <a:spcPts val="0"/>
+              </a:spcAft>
+            </a:pPr>
+            <a:r>
+              <a:rPr lang="en-US" altLang="zh-CN" sz="1400" kern="100" dirty="0">
+                <a:effectLst/>
+                <a:latin typeface="等线" panose="02010600030101010101" pitchFamily="2" charset="-122"/>
+                <a:ea typeface="等线" panose="02010600030101010101" pitchFamily="2" charset="-122"/>
+                <a:cs typeface="Times New Roman" panose="02020603050405020304" pitchFamily="18" charset="0"/>
+              </a:rPr>
+              <a:t>“</a:t>
+            </a:r>
+            <a:r>
+              <a:rPr lang="zh-CN" altLang="en-US" sz="1400" kern="100" dirty="0">
+                <a:effectLst/>
+                <a:latin typeface="等线" panose="02010600030101010101" pitchFamily="2" charset="-122"/>
+                <a:ea typeface="等线" panose="02010600030101010101" pitchFamily="2" charset="-122"/>
+                <a:cs typeface="Times New Roman" panose="02020603050405020304" pitchFamily="18" charset="0"/>
+              </a:rPr>
+              <a:t>重复</a:t>
+            </a:r>
+            <a:r>
+              <a:rPr lang="en-US" altLang="zh-CN" sz="1400" kern="100" dirty="0">
+                <a:effectLst/>
+                <a:latin typeface="等线" panose="02010600030101010101" pitchFamily="2" charset="-122"/>
+                <a:ea typeface="等线" panose="02010600030101010101" pitchFamily="2" charset="-122"/>
+                <a:cs typeface="Times New Roman" panose="02020603050405020304" pitchFamily="18" charset="0"/>
+              </a:rPr>
+              <a:t>”</a:t>
+            </a:r>
+            <a:r>
+              <a:rPr lang="zh-CN" altLang="en-US" sz="1400" kern="100" dirty="0">
+                <a:latin typeface="等线" panose="02010600030101010101" pitchFamily="2" charset="-122"/>
+                <a:ea typeface="等线" panose="02010600030101010101" pitchFamily="2" charset="-122"/>
+                <a:cs typeface="Times New Roman" panose="02020603050405020304" pitchFamily="18" charset="0"/>
+              </a:rPr>
+              <a:t>会在一个小节重复四次同样节奏</a:t>
+            </a:r>
+            <a:endParaRPr lang="en-US" altLang="zh-CN" sz="1400" kern="100" dirty="0">
+              <a:latin typeface="等线" panose="02010600030101010101" pitchFamily="2" charset="-122"/>
+              <a:ea typeface="等线" panose="02010600030101010101" pitchFamily="2" charset="-122"/>
+              <a:cs typeface="Times New Roman" panose="02020603050405020304" pitchFamily="18" charset="0"/>
+            </a:endParaRPr>
+          </a:p>
+          <a:p>
+            <a:pPr algn="just">
+              <a:spcAft>
+                <a:spcPts val="0"/>
+              </a:spcAft>
+            </a:pPr>
+            <a:r>
+              <a:rPr lang="zh-CN" altLang="en-US" sz="1400" kern="100" dirty="0">
+                <a:effectLst/>
+                <a:latin typeface="等线" panose="02010600030101010101" pitchFamily="2" charset="-122"/>
+                <a:ea typeface="等线" panose="02010600030101010101" pitchFamily="2" charset="-122"/>
+                <a:cs typeface="Times New Roman" panose="02020603050405020304" pitchFamily="18" charset="0"/>
+              </a:rPr>
+              <a:t>“随机”会根据</a:t>
+            </a:r>
+            <a:r>
+              <a:rPr lang="zh-CN" altLang="en-US" sz="1400" kern="100" dirty="0">
+                <a:latin typeface="等线" panose="02010600030101010101" pitchFamily="2" charset="-122"/>
+                <a:ea typeface="等线" panose="02010600030101010101" pitchFamily="2" charset="-122"/>
+                <a:cs typeface="Times New Roman" panose="02020603050405020304" pitchFamily="18" charset="0"/>
+              </a:rPr>
+              <a:t>配置随机组合出</a:t>
+            </a:r>
+            <a:r>
+              <a:rPr lang="en-US" altLang="zh-CN" sz="1400" kern="100" dirty="0">
+                <a:latin typeface="等线" panose="02010600030101010101" pitchFamily="2" charset="-122"/>
+                <a:ea typeface="等线" panose="02010600030101010101" pitchFamily="2" charset="-122"/>
+                <a:cs typeface="Times New Roman" panose="02020603050405020304" pitchFamily="18" charset="0"/>
+              </a:rPr>
+              <a:t>100</a:t>
+            </a:r>
+            <a:r>
+              <a:rPr lang="zh-CN" altLang="en-US" sz="1400" kern="100" dirty="0">
+                <a:latin typeface="等线" panose="02010600030101010101" pitchFamily="2" charset="-122"/>
+                <a:ea typeface="等线" panose="02010600030101010101" pitchFamily="2" charset="-122"/>
+                <a:cs typeface="Times New Roman" panose="02020603050405020304" pitchFamily="18" charset="0"/>
+              </a:rPr>
+              <a:t>个小节的练习，每次都不一样</a:t>
+            </a:r>
+            <a:endParaRPr lang="zh-CN" sz="1400" kern="100" dirty="0">
+              <a:effectLst/>
+              <a:latin typeface="等线" panose="02010600030101010101" pitchFamily="2" charset="-122"/>
+              <a:ea typeface="等线" panose="02010600030101010101" pitchFamily="2" charset="-122"/>
+              <a:cs typeface="Times New Roman" panose="02020603050405020304" pitchFamily="18" charset="0"/>
+            </a:endParaRPr>
+          </a:p>
+        </p:txBody>
+      </p:sp>
+      <p:cxnSp>
+        <p:nvCxnSpPr>
+          <p:cNvPr id="6" name="Straight Connector 5">
+            <a:extLst>
+              <a:ext uri="{FF2B5EF4-FFF2-40B4-BE49-F238E27FC236}">
+                <a16:creationId xmlns:a16="http://schemas.microsoft.com/office/drawing/2014/main" id="{C7BEABD6-004E-464C-AB9D-8F0FC1966DA3}"/>
+              </a:ext>
+            </a:extLst>
+          </p:cNvPr>
+          <p:cNvCxnSpPr>
+            <a:cxnSpLocks/>
+          </p:cNvCxnSpPr>
+          <p:nvPr/>
+        </p:nvCxnSpPr>
+        <p:spPr>
+          <a:xfrm>
+            <a:off x="3123432" y="5619274"/>
+            <a:ext cx="3787215" cy="0"/>
+          </a:xfrm>
+          <a:prstGeom prst="line">
+            <a:avLst/>
+          </a:prstGeom>
+          <a:ln w="28575">
+            <a:headEnd type="none" w="med" len="med"/>
+            <a:tailEnd type="none" w="med" len="med"/>
+          </a:ln>
+        </p:spPr>
+        <p:style>
+          <a:lnRef idx="1">
+            <a:schemeClr val="accent1"/>
+          </a:lnRef>
+          <a:fillRef idx="0">
+            <a:schemeClr val="accent1"/>
+          </a:fillRef>
+          <a:effectRef idx="0">
+            <a:schemeClr val="accent1"/>
+          </a:effectRef>
+          <a:fontRef idx="minor">
+            <a:schemeClr val="tx1"/>
+          </a:fontRef>
+        </p:style>
+      </p:cxnSp>
+      <p:cxnSp>
+        <p:nvCxnSpPr>
+          <p:cNvPr id="8" name="Straight Arrow Connector 7">
+            <a:extLst>
+              <a:ext uri="{FF2B5EF4-FFF2-40B4-BE49-F238E27FC236}">
+                <a16:creationId xmlns:a16="http://schemas.microsoft.com/office/drawing/2014/main" id="{6267AA51-B208-47D7-8E32-81AA2029D1B9}"/>
+              </a:ext>
+            </a:extLst>
+          </p:cNvPr>
+          <p:cNvCxnSpPr>
+            <a:cxnSpLocks/>
+          </p:cNvCxnSpPr>
+          <p:nvPr/>
+        </p:nvCxnSpPr>
+        <p:spPr>
+          <a:xfrm flipH="1" flipV="1">
+            <a:off x="4834460" y="2549236"/>
+            <a:ext cx="13657" cy="1703678"/>
+          </a:xfrm>
+          <a:prstGeom prst="straightConnector1">
+            <a:avLst/>
+          </a:prstGeom>
+          <a:ln w="28575">
+            <a:tailEnd type="triangle"/>
+          </a:ln>
+        </p:spPr>
+        <p:style>
+          <a:lnRef idx="1">
+            <a:schemeClr val="accent1"/>
+          </a:lnRef>
+          <a:fillRef idx="0">
+            <a:schemeClr val="accent1"/>
+          </a:fillRef>
+          <a:effectRef idx="0">
+            <a:schemeClr val="accent1"/>
+          </a:effectRef>
+          <a:fontRef idx="minor">
+            <a:schemeClr val="tx1"/>
+          </a:fontRef>
+        </p:style>
+      </p:cxnSp>
+      <p:sp>
+        <p:nvSpPr>
+          <p:cNvPr id="9" name="Text Box 11">
+            <a:extLst>
+              <a:ext uri="{FF2B5EF4-FFF2-40B4-BE49-F238E27FC236}">
+                <a16:creationId xmlns:a16="http://schemas.microsoft.com/office/drawing/2014/main" id="{D9C4356B-6DA2-4253-AF04-57B7C3E65454}"/>
+              </a:ext>
+            </a:extLst>
+          </p:cNvPr>
+          <p:cNvSpPr txBox="1"/>
+          <p:nvPr/>
+        </p:nvSpPr>
+        <p:spPr>
+          <a:xfrm>
+            <a:off x="4801121" y="3868192"/>
+            <a:ext cx="1965440" cy="451219"/>
+          </a:xfrm>
+          <a:prstGeom prst="rect">
+            <a:avLst/>
+          </a:prstGeom>
+          <a:noFill/>
+          <a:ln w="6350">
+            <a:noFill/>
+          </a:ln>
+        </p:spPr>
+        <p:txBody>
+          <a:bodyPr rot="0" spcFirstLastPara="0" vert="horz" wrap="square" lIns="91440" tIns="45720" rIns="91440" bIns="45720" numCol="1" spcCol="0" rtlCol="0" fromWordArt="0" anchor="t" anchorCtr="0" forceAA="0" compatLnSpc="1">
+            <a:prstTxWarp prst="textNoShape">
+              <a:avLst/>
+            </a:prstTxWarp>
+            <a:noAutofit/>
+          </a:bodyPr>
+          <a:lstStyle/>
+          <a:p>
+            <a:pPr algn="just">
+              <a:spcAft>
+                <a:spcPts val="0"/>
+              </a:spcAft>
+            </a:pPr>
+            <a:r>
+              <a:rPr lang="zh-CN" altLang="en-US" sz="1400" kern="100" dirty="0">
+                <a:effectLst/>
+                <a:latin typeface="等线" panose="02010600030101010101" pitchFamily="2" charset="-122"/>
+                <a:ea typeface="等线" panose="02010600030101010101" pitchFamily="2" charset="-122"/>
+                <a:cs typeface="Times New Roman" panose="02020603050405020304" pitchFamily="18" charset="0"/>
+              </a:rPr>
+              <a:t>每小节出现几个三连音</a:t>
+            </a:r>
+            <a:endParaRPr lang="zh-CN" sz="1400" kern="100" dirty="0">
+              <a:effectLst/>
+              <a:latin typeface="等线" panose="02010600030101010101" pitchFamily="2" charset="-122"/>
+              <a:ea typeface="等线" panose="02010600030101010101" pitchFamily="2" charset="-122"/>
+              <a:cs typeface="Times New Roman" panose="02020603050405020304" pitchFamily="18" charset="0"/>
+            </a:endParaRPr>
+          </a:p>
+        </p:txBody>
+      </p:sp>
+      <p:cxnSp>
+        <p:nvCxnSpPr>
+          <p:cNvPr id="10" name="Straight Connector 9">
+            <a:extLst>
+              <a:ext uri="{FF2B5EF4-FFF2-40B4-BE49-F238E27FC236}">
+                <a16:creationId xmlns:a16="http://schemas.microsoft.com/office/drawing/2014/main" id="{8EBC86BF-E139-4680-80B1-C6501F1B08D3}"/>
+              </a:ext>
+            </a:extLst>
+          </p:cNvPr>
+          <p:cNvCxnSpPr>
+            <a:cxnSpLocks/>
+          </p:cNvCxnSpPr>
+          <p:nvPr/>
+        </p:nvCxnSpPr>
+        <p:spPr>
+          <a:xfrm>
+            <a:off x="4835854" y="4252911"/>
+            <a:ext cx="1930707" cy="0"/>
+          </a:xfrm>
+          <a:prstGeom prst="line">
+            <a:avLst/>
+          </a:prstGeom>
+          <a:ln w="28575">
+            <a:headEnd type="none" w="med" len="med"/>
+            <a:tailEnd type="none" w="med" len="med"/>
+          </a:ln>
+        </p:spPr>
+        <p:style>
+          <a:lnRef idx="1">
+            <a:schemeClr val="accent1"/>
+          </a:lnRef>
+          <a:fillRef idx="0">
+            <a:schemeClr val="accent1"/>
+          </a:fillRef>
+          <a:effectRef idx="0">
+            <a:schemeClr val="accent1"/>
+          </a:effectRef>
+          <a:fontRef idx="minor">
+            <a:schemeClr val="tx1"/>
+          </a:fontRef>
+        </p:style>
+      </p:cxnSp>
+      <p:cxnSp>
+        <p:nvCxnSpPr>
+          <p:cNvPr id="14" name="Straight Arrow Connector 13">
+            <a:extLst>
+              <a:ext uri="{FF2B5EF4-FFF2-40B4-BE49-F238E27FC236}">
+                <a16:creationId xmlns:a16="http://schemas.microsoft.com/office/drawing/2014/main" id="{239E6A04-3493-402E-A994-2AF554655C9A}"/>
+              </a:ext>
+            </a:extLst>
+          </p:cNvPr>
+          <p:cNvCxnSpPr>
+            <a:cxnSpLocks/>
+          </p:cNvCxnSpPr>
+          <p:nvPr/>
+        </p:nvCxnSpPr>
+        <p:spPr>
+          <a:xfrm flipH="1" flipV="1">
+            <a:off x="6537376" y="2549236"/>
+            <a:ext cx="9508" cy="1185960"/>
+          </a:xfrm>
+          <a:prstGeom prst="straightConnector1">
+            <a:avLst/>
+          </a:prstGeom>
+          <a:ln w="28575">
+            <a:tailEnd type="triangle"/>
+          </a:ln>
+        </p:spPr>
+        <p:style>
+          <a:lnRef idx="1">
+            <a:schemeClr val="accent1"/>
+          </a:lnRef>
+          <a:fillRef idx="0">
+            <a:schemeClr val="accent1"/>
+          </a:fillRef>
+          <a:effectRef idx="0">
+            <a:schemeClr val="accent1"/>
+          </a:effectRef>
+          <a:fontRef idx="minor">
+            <a:schemeClr val="tx1"/>
+          </a:fontRef>
+        </p:style>
+      </p:cxnSp>
+      <p:sp>
+        <p:nvSpPr>
+          <p:cNvPr id="15" name="Text Box 11">
+            <a:extLst>
+              <a:ext uri="{FF2B5EF4-FFF2-40B4-BE49-F238E27FC236}">
+                <a16:creationId xmlns:a16="http://schemas.microsoft.com/office/drawing/2014/main" id="{66D630D9-A6F4-42A0-87EA-93C1BA4CC393}"/>
+              </a:ext>
+            </a:extLst>
+          </p:cNvPr>
+          <p:cNvSpPr txBox="1"/>
+          <p:nvPr/>
+        </p:nvSpPr>
+        <p:spPr>
+          <a:xfrm>
+            <a:off x="6499886" y="3350474"/>
+            <a:ext cx="2519619" cy="451219"/>
+          </a:xfrm>
+          <a:prstGeom prst="rect">
+            <a:avLst/>
+          </a:prstGeom>
+          <a:noFill/>
+          <a:ln w="6350">
+            <a:noFill/>
+          </a:ln>
+        </p:spPr>
+        <p:txBody>
+          <a:bodyPr rot="0" spcFirstLastPara="0" vert="horz" wrap="square" lIns="91440" tIns="45720" rIns="91440" bIns="45720" numCol="1" spcCol="0" rtlCol="0" fromWordArt="0" anchor="t" anchorCtr="0" forceAA="0" compatLnSpc="1">
+            <a:prstTxWarp prst="textNoShape">
+              <a:avLst/>
+            </a:prstTxWarp>
+            <a:noAutofit/>
+          </a:bodyPr>
+          <a:lstStyle/>
+          <a:p>
+            <a:pPr algn="just">
+              <a:spcAft>
+                <a:spcPts val="0"/>
+              </a:spcAft>
+            </a:pPr>
+            <a:r>
+              <a:rPr lang="zh-CN" altLang="en-US" sz="1400" kern="100" dirty="0">
+                <a:effectLst/>
+                <a:latin typeface="等线" panose="02010600030101010101" pitchFamily="2" charset="-122"/>
+                <a:ea typeface="等线" panose="02010600030101010101" pitchFamily="2" charset="-122"/>
+                <a:cs typeface="Times New Roman" panose="02020603050405020304" pitchFamily="18" charset="0"/>
+              </a:rPr>
+              <a:t>选择之后只出现</a:t>
+            </a:r>
+            <a:r>
+              <a:rPr lang="en-US" altLang="zh-CN" sz="1400" kern="100" dirty="0">
+                <a:latin typeface="等线" panose="02010600030101010101" pitchFamily="2" charset="-122"/>
+                <a:ea typeface="等线" panose="02010600030101010101" pitchFamily="2" charset="-122"/>
+                <a:cs typeface="Times New Roman" panose="02020603050405020304" pitchFamily="18" charset="0"/>
+              </a:rPr>
+              <a:t>1/16</a:t>
+            </a:r>
+            <a:r>
+              <a:rPr lang="zh-CN" altLang="en-US" sz="1400" kern="100" dirty="0">
+                <a:latin typeface="等线" panose="02010600030101010101" pitchFamily="2" charset="-122"/>
+                <a:ea typeface="等线" panose="02010600030101010101" pitchFamily="2" charset="-122"/>
+                <a:cs typeface="Times New Roman" panose="02020603050405020304" pitchFamily="18" charset="0"/>
+              </a:rPr>
+              <a:t>音符</a:t>
+            </a:r>
+            <a:endParaRPr lang="zh-CN" sz="1400" kern="100" dirty="0">
+              <a:effectLst/>
+              <a:latin typeface="等线" panose="02010600030101010101" pitchFamily="2" charset="-122"/>
+              <a:ea typeface="等线" panose="02010600030101010101" pitchFamily="2" charset="-122"/>
+              <a:cs typeface="Times New Roman" panose="02020603050405020304" pitchFamily="18" charset="0"/>
+            </a:endParaRPr>
+          </a:p>
+        </p:txBody>
+      </p:sp>
+      <p:cxnSp>
+        <p:nvCxnSpPr>
+          <p:cNvPr id="16" name="Straight Connector 15">
+            <a:extLst>
+              <a:ext uri="{FF2B5EF4-FFF2-40B4-BE49-F238E27FC236}">
+                <a16:creationId xmlns:a16="http://schemas.microsoft.com/office/drawing/2014/main" id="{8EFF288D-00A4-4020-A19B-0C5D0F07BE99}"/>
+              </a:ext>
+            </a:extLst>
+          </p:cNvPr>
+          <p:cNvCxnSpPr>
+            <a:cxnSpLocks/>
+          </p:cNvCxnSpPr>
+          <p:nvPr/>
+        </p:nvCxnSpPr>
+        <p:spPr>
+          <a:xfrm>
+            <a:off x="6534620" y="3735193"/>
+            <a:ext cx="2675882" cy="0"/>
+          </a:xfrm>
+          <a:prstGeom prst="line">
+            <a:avLst/>
+          </a:prstGeom>
+          <a:ln w="28575">
+            <a:headEnd type="none" w="med" len="med"/>
+            <a:tailEnd type="none" w="med" len="med"/>
+          </a:ln>
+        </p:spPr>
+        <p:style>
+          <a:lnRef idx="1">
+            <a:schemeClr val="accent1"/>
+          </a:lnRef>
+          <a:fillRef idx="0">
+            <a:schemeClr val="accent1"/>
+          </a:fillRef>
+          <a:effectRef idx="0">
+            <a:schemeClr val="accent1"/>
+          </a:effectRef>
+          <a:fontRef idx="minor">
+            <a:schemeClr val="tx1"/>
+          </a:fontRef>
+        </p:style>
+      </p:cxnSp>
+      <p:cxnSp>
+        <p:nvCxnSpPr>
+          <p:cNvPr id="20" name="Straight Arrow Connector 19">
+            <a:extLst>
+              <a:ext uri="{FF2B5EF4-FFF2-40B4-BE49-F238E27FC236}">
+                <a16:creationId xmlns:a16="http://schemas.microsoft.com/office/drawing/2014/main" id="{6896B466-315E-4128-B7D3-284D6821BEB1}"/>
+              </a:ext>
+            </a:extLst>
+          </p:cNvPr>
+          <p:cNvCxnSpPr>
+            <a:cxnSpLocks/>
+          </p:cNvCxnSpPr>
+          <p:nvPr/>
+        </p:nvCxnSpPr>
+        <p:spPr>
+          <a:xfrm flipV="1">
+            <a:off x="8120760" y="2531886"/>
+            <a:ext cx="0" cy="685592"/>
+          </a:xfrm>
+          <a:prstGeom prst="straightConnector1">
+            <a:avLst/>
+          </a:prstGeom>
+          <a:ln w="28575">
+            <a:tailEnd type="triangle"/>
+          </a:ln>
+        </p:spPr>
+        <p:style>
+          <a:lnRef idx="1">
+            <a:schemeClr val="accent1"/>
+          </a:lnRef>
+          <a:fillRef idx="0">
+            <a:schemeClr val="accent1"/>
+          </a:fillRef>
+          <a:effectRef idx="0">
+            <a:schemeClr val="accent1"/>
+          </a:effectRef>
+          <a:fontRef idx="minor">
+            <a:schemeClr val="tx1"/>
+          </a:fontRef>
+        </p:style>
+      </p:cxnSp>
+      <p:sp>
+        <p:nvSpPr>
+          <p:cNvPr id="21" name="Text Box 11">
+            <a:extLst>
+              <a:ext uri="{FF2B5EF4-FFF2-40B4-BE49-F238E27FC236}">
+                <a16:creationId xmlns:a16="http://schemas.microsoft.com/office/drawing/2014/main" id="{3EE70722-AD1D-492E-A645-20F1B560A09B}"/>
+              </a:ext>
+            </a:extLst>
+          </p:cNvPr>
+          <p:cNvSpPr txBox="1"/>
+          <p:nvPr/>
+        </p:nvSpPr>
+        <p:spPr>
+          <a:xfrm>
+            <a:off x="8073762" y="2832756"/>
+            <a:ext cx="2519619" cy="451219"/>
+          </a:xfrm>
+          <a:prstGeom prst="rect">
+            <a:avLst/>
+          </a:prstGeom>
+          <a:noFill/>
+          <a:ln w="6350">
+            <a:noFill/>
+          </a:ln>
+        </p:spPr>
+        <p:txBody>
+          <a:bodyPr rot="0" spcFirstLastPara="0" vert="horz" wrap="square" lIns="91440" tIns="45720" rIns="91440" bIns="45720" numCol="1" spcCol="0" rtlCol="0" fromWordArt="0" anchor="t" anchorCtr="0" forceAA="0" compatLnSpc="1">
+            <a:prstTxWarp prst="textNoShape">
+              <a:avLst/>
+            </a:prstTxWarp>
+            <a:noAutofit/>
+          </a:bodyPr>
+          <a:lstStyle/>
+          <a:p>
+            <a:pPr algn="just">
+              <a:spcAft>
+                <a:spcPts val="0"/>
+              </a:spcAft>
+            </a:pPr>
+            <a:r>
+              <a:rPr lang="zh-CN" altLang="en-US" sz="1400" kern="100" dirty="0">
+                <a:effectLst/>
+                <a:latin typeface="等线" panose="02010600030101010101" pitchFamily="2" charset="-122"/>
+                <a:ea typeface="等线" panose="02010600030101010101" pitchFamily="2" charset="-122"/>
+                <a:cs typeface="Times New Roman" panose="02020603050405020304" pitchFamily="18" charset="0"/>
+              </a:rPr>
+              <a:t>选择之后会</a:t>
+            </a:r>
+            <a:r>
+              <a:rPr lang="zh-CN" altLang="en-US" sz="1400" kern="100" dirty="0">
+                <a:latin typeface="等线" panose="02010600030101010101" pitchFamily="2" charset="-122"/>
+                <a:ea typeface="等线" panose="02010600030101010101" pitchFamily="2" charset="-122"/>
+                <a:cs typeface="Times New Roman" panose="02020603050405020304" pitchFamily="18" charset="0"/>
+              </a:rPr>
+              <a:t>在偶数拍插入休止</a:t>
+            </a:r>
+            <a:endParaRPr lang="zh-CN" sz="1400" kern="100" dirty="0">
+              <a:effectLst/>
+              <a:latin typeface="等线" panose="02010600030101010101" pitchFamily="2" charset="-122"/>
+              <a:ea typeface="等线" panose="02010600030101010101" pitchFamily="2" charset="-122"/>
+              <a:cs typeface="Times New Roman" panose="02020603050405020304" pitchFamily="18" charset="0"/>
+            </a:endParaRPr>
+          </a:p>
+        </p:txBody>
+      </p:sp>
+      <p:cxnSp>
+        <p:nvCxnSpPr>
+          <p:cNvPr id="22" name="Straight Connector 21">
+            <a:extLst>
+              <a:ext uri="{FF2B5EF4-FFF2-40B4-BE49-F238E27FC236}">
+                <a16:creationId xmlns:a16="http://schemas.microsoft.com/office/drawing/2014/main" id="{AD087E05-2B65-4D6B-9AA2-6E43F87FA254}"/>
+              </a:ext>
+            </a:extLst>
+          </p:cNvPr>
+          <p:cNvCxnSpPr>
+            <a:cxnSpLocks/>
+          </p:cNvCxnSpPr>
+          <p:nvPr/>
+        </p:nvCxnSpPr>
+        <p:spPr>
+          <a:xfrm>
+            <a:off x="8108496" y="3217475"/>
+            <a:ext cx="2675882" cy="0"/>
+          </a:xfrm>
+          <a:prstGeom prst="line">
+            <a:avLst/>
+          </a:prstGeom>
+          <a:ln w="28575">
+            <a:headEnd type="none" w="med" len="med"/>
+            <a:tailEnd type="none" w="med" len="med"/>
+          </a:ln>
+        </p:spPr>
+        <p:style>
+          <a:lnRef idx="1">
+            <a:schemeClr val="accent1"/>
+          </a:lnRef>
+          <a:fillRef idx="0">
+            <a:schemeClr val="accent1"/>
+          </a:fillRef>
+          <a:effectRef idx="0">
+            <a:schemeClr val="accent1"/>
+          </a:effectRef>
+          <a:fontRef idx="minor">
+            <a:schemeClr val="tx1"/>
+          </a:fontRef>
+        </p:style>
+      </p:cxnSp>
+      <p:cxnSp>
+        <p:nvCxnSpPr>
+          <p:cNvPr id="25" name="Straight Arrow Connector 24">
+            <a:extLst>
+              <a:ext uri="{FF2B5EF4-FFF2-40B4-BE49-F238E27FC236}">
+                <a16:creationId xmlns:a16="http://schemas.microsoft.com/office/drawing/2014/main" id="{60A72898-DC43-423B-ADEF-1155065DB415}"/>
+              </a:ext>
+            </a:extLst>
+          </p:cNvPr>
+          <p:cNvCxnSpPr>
+            <a:cxnSpLocks/>
+          </p:cNvCxnSpPr>
+          <p:nvPr/>
+        </p:nvCxnSpPr>
+        <p:spPr>
+          <a:xfrm flipH="1">
+            <a:off x="10150835" y="1281770"/>
+            <a:ext cx="1" cy="557268"/>
+          </a:xfrm>
+          <a:prstGeom prst="straightConnector1">
+            <a:avLst/>
+          </a:prstGeom>
+          <a:ln w="28575">
+            <a:tailEnd type="triangle"/>
+          </a:ln>
+        </p:spPr>
+        <p:style>
+          <a:lnRef idx="1">
+            <a:schemeClr val="accent1"/>
+          </a:lnRef>
+          <a:fillRef idx="0">
+            <a:schemeClr val="accent1"/>
+          </a:fillRef>
+          <a:effectRef idx="0">
+            <a:schemeClr val="accent1"/>
+          </a:effectRef>
+          <a:fontRef idx="minor">
+            <a:schemeClr val="tx1"/>
+          </a:fontRef>
+        </p:style>
+      </p:cxnSp>
+      <p:sp>
+        <p:nvSpPr>
+          <p:cNvPr id="26" name="Text Box 11">
+            <a:extLst>
+              <a:ext uri="{FF2B5EF4-FFF2-40B4-BE49-F238E27FC236}">
+                <a16:creationId xmlns:a16="http://schemas.microsoft.com/office/drawing/2014/main" id="{A9CF3A41-3D10-4E1A-A696-541D5576B14A}"/>
+              </a:ext>
+            </a:extLst>
+          </p:cNvPr>
+          <p:cNvSpPr txBox="1"/>
+          <p:nvPr/>
+        </p:nvSpPr>
+        <p:spPr>
+          <a:xfrm>
+            <a:off x="6590324" y="886690"/>
+            <a:ext cx="3217891" cy="461575"/>
+          </a:xfrm>
+          <a:prstGeom prst="rect">
+            <a:avLst/>
+          </a:prstGeom>
+          <a:noFill/>
+          <a:ln w="6350">
+            <a:noFill/>
+          </a:ln>
+        </p:spPr>
+        <p:txBody>
+          <a:bodyPr rot="0" spcFirstLastPara="0" vert="horz" wrap="square" lIns="91440" tIns="45720" rIns="91440" bIns="45720" numCol="1" spcCol="0" rtlCol="0" fromWordArt="0" anchor="t" anchorCtr="0" forceAA="0" compatLnSpc="1">
+            <a:prstTxWarp prst="textNoShape">
+              <a:avLst/>
+            </a:prstTxWarp>
+            <a:noAutofit/>
+          </a:bodyPr>
+          <a:lstStyle/>
+          <a:p>
+            <a:pPr algn="just">
+              <a:spcAft>
+                <a:spcPts val="0"/>
+              </a:spcAft>
+            </a:pPr>
+            <a:r>
+              <a:rPr lang="zh-CN" altLang="en-US" sz="1400" kern="100" dirty="0">
+                <a:latin typeface="等线" panose="02010600030101010101" pitchFamily="2" charset="-122"/>
+                <a:ea typeface="等线" panose="02010600030101010101" pitchFamily="2" charset="-122"/>
+                <a:cs typeface="Times New Roman" panose="02020603050405020304" pitchFamily="18" charset="0"/>
+              </a:rPr>
+              <a:t>勾选之后在三连音拍里面插入休止</a:t>
+            </a:r>
+            <a:endParaRPr lang="zh-CN" sz="1400" kern="100" dirty="0">
+              <a:effectLst/>
+              <a:latin typeface="等线" panose="02010600030101010101" pitchFamily="2" charset="-122"/>
+              <a:ea typeface="等线" panose="02010600030101010101" pitchFamily="2" charset="-122"/>
+              <a:cs typeface="Times New Roman" panose="02020603050405020304" pitchFamily="18" charset="0"/>
+            </a:endParaRPr>
+          </a:p>
+        </p:txBody>
+      </p:sp>
+      <p:cxnSp>
+        <p:nvCxnSpPr>
+          <p:cNvPr id="27" name="Straight Connector 26">
+            <a:extLst>
+              <a:ext uri="{FF2B5EF4-FFF2-40B4-BE49-F238E27FC236}">
+                <a16:creationId xmlns:a16="http://schemas.microsoft.com/office/drawing/2014/main" id="{6D8C377B-5B16-49C2-A7E3-C8CAC671357E}"/>
+              </a:ext>
+            </a:extLst>
+          </p:cNvPr>
+          <p:cNvCxnSpPr>
+            <a:cxnSpLocks/>
+          </p:cNvCxnSpPr>
+          <p:nvPr/>
+        </p:nvCxnSpPr>
+        <p:spPr>
+          <a:xfrm>
+            <a:off x="6625058" y="1281765"/>
+            <a:ext cx="3525777" cy="0"/>
+          </a:xfrm>
+          <a:prstGeom prst="line">
+            <a:avLst/>
+          </a:prstGeom>
+          <a:ln w="28575">
+            <a:headEnd type="none" w="med" len="med"/>
+            <a:tailEnd type="none" w="med" len="med"/>
+          </a:ln>
+        </p:spPr>
+        <p:style>
+          <a:lnRef idx="1">
+            <a:schemeClr val="accent1"/>
+          </a:lnRef>
+          <a:fillRef idx="0">
+            <a:schemeClr val="accent1"/>
+          </a:fillRef>
+          <a:effectRef idx="0">
+            <a:schemeClr val="accent1"/>
+          </a:effectRef>
+          <a:fontRef idx="minor">
+            <a:schemeClr val="tx1"/>
+          </a:fontRef>
+        </p:style>
+      </p:cxnSp>
+      <p:sp>
+        <p:nvSpPr>
+          <p:cNvPr id="28" name="Title 1">
+            <a:extLst>
+              <a:ext uri="{FF2B5EF4-FFF2-40B4-BE49-F238E27FC236}">
+                <a16:creationId xmlns:a16="http://schemas.microsoft.com/office/drawing/2014/main" id="{4092B6D9-0890-460D-9581-826563972ED7}"/>
+              </a:ext>
+            </a:extLst>
+          </p:cNvPr>
+          <p:cNvSpPr txBox="1">
+            <a:spLocks/>
+          </p:cNvSpPr>
+          <p:nvPr/>
+        </p:nvSpPr>
+        <p:spPr>
+          <a:xfrm>
+            <a:off x="566651" y="6039240"/>
+            <a:ext cx="10515600" cy="818760"/>
+          </a:xfrm>
+          <a:prstGeom prst="rect">
+            <a:avLst/>
+          </a:prstGeom>
+        </p:spPr>
+        <p:txBody>
+          <a:bodyPr vert="horz" lIns="91440" tIns="45720" rIns="91440" bIns="45720" rtlCol="0" anchor="ctr">
+            <a:normAutofit/>
+          </a:bodyPr>
+          <a:lstStyle>
+            <a:lvl1pPr algn="l" defTabSz="914400" rtl="0" eaLnBrk="1" latinLnBrk="0" hangingPunct="1">
+              <a:lnSpc>
+                <a:spcPct val="90000"/>
+              </a:lnSpc>
+              <a:spcBef>
+                <a:spcPct val="0"/>
+              </a:spcBef>
+              <a:buNone/>
+              <a:defRPr sz="4400" kern="1200">
+                <a:solidFill>
+                  <a:schemeClr val="tx1"/>
+                </a:solidFill>
+                <a:latin typeface="+mj-lt"/>
+                <a:ea typeface="+mj-ea"/>
+                <a:cs typeface="+mj-cs"/>
+              </a:defRPr>
+            </a:lvl1pPr>
+          </a:lstStyle>
+          <a:p>
+            <a:r>
+              <a:rPr lang="zh-CN" altLang="en-US" sz="2800" dirty="0"/>
+              <a:t>下面几页有一些不同难度的组合给大家参考</a:t>
+            </a:r>
+          </a:p>
+        </p:txBody>
+      </p:sp>
     </p:spTree>
     <p:extLst>
       <p:ext uri="{BB962C8B-B14F-4D97-AF65-F5344CB8AC3E}">
-        <p14:creationId xmlns:p14="http://schemas.microsoft.com/office/powerpoint/2010/main" val="211970903"/>
+        <p14:creationId xmlns:p14="http://schemas.microsoft.com/office/powerpoint/2010/main" val="3919112610"/>
       </p:ext>
     </p:extLst>
   </p:cSld>
@@ -6415,10 +6500,10 @@
       </p:grpSpPr>
       <p:sp>
         <p:nvSpPr>
-          <p:cNvPr id="2" name="Title 1">
-            <a:extLst>
-              <a:ext uri="{FF2B5EF4-FFF2-40B4-BE49-F238E27FC236}">
-                <a16:creationId xmlns:a16="http://schemas.microsoft.com/office/drawing/2014/main" id="{55DFD349-569F-4BA6-B1C1-4188FD2BFBEB}"/>
+          <p:cNvPr id="3" name="Title 2">
+            <a:extLst>
+              <a:ext uri="{FF2B5EF4-FFF2-40B4-BE49-F238E27FC236}">
+                <a16:creationId xmlns:a16="http://schemas.microsoft.com/office/drawing/2014/main" id="{F2E17C7D-6781-4541-8B98-B03729B02C8E}"/>
               </a:ext>
             </a:extLst>
           </p:cNvPr>
@@ -6436,17 +6521,25 @@
           <a:p>
             <a:r>
               <a:rPr lang="zh-CN" altLang="en-US" dirty="0"/>
-              <a:t>没有休止，加入不同时长</a:t>
+              <a:t>在</a:t>
+            </a:r>
+            <a:r>
+              <a:rPr lang="en-US" altLang="zh-CN" dirty="0"/>
+              <a:t>16</a:t>
+            </a:r>
+            <a:r>
+              <a:rPr lang="zh-CN" altLang="en-US" dirty="0"/>
+              <a:t>分的不同位置练习休止（重复和随机）</a:t>
             </a:r>
           </a:p>
         </p:txBody>
       </p:sp>
       <p:pic>
         <p:nvPicPr>
-          <p:cNvPr id="3" name="Picture 2">
-            <a:extLst>
-              <a:ext uri="{FF2B5EF4-FFF2-40B4-BE49-F238E27FC236}">
-                <a16:creationId xmlns:a16="http://schemas.microsoft.com/office/drawing/2014/main" id="{1C76CDEE-CF28-4269-8562-8D45C3009E77}"/>
+          <p:cNvPr id="4" name="Picture 3">
+            <a:extLst>
+              <a:ext uri="{FF2B5EF4-FFF2-40B4-BE49-F238E27FC236}">
+                <a16:creationId xmlns:a16="http://schemas.microsoft.com/office/drawing/2014/main" id="{11B95BA1-9C18-4EC8-A457-A9D49D7C9D80}"/>
               </a:ext>
             </a:extLst>
           </p:cNvPr>
@@ -6463,8 +6556,38 @@
         </p:blipFill>
         <p:spPr>
           <a:xfrm>
-            <a:off x="828675" y="1866139"/>
-            <a:ext cx="8872008" cy="3888548"/>
+            <a:off x="87099" y="1769533"/>
+            <a:ext cx="6401618" cy="3783542"/>
+          </a:xfrm>
+          <a:prstGeom prst="rect">
+            <a:avLst/>
+          </a:prstGeom>
+        </p:spPr>
+      </p:pic>
+      <p:pic>
+        <p:nvPicPr>
+          <p:cNvPr id="5" name="Picture 4">
+            <a:extLst>
+              <a:ext uri="{FF2B5EF4-FFF2-40B4-BE49-F238E27FC236}">
+                <a16:creationId xmlns:a16="http://schemas.microsoft.com/office/drawing/2014/main" id="{F54780FF-D191-47B9-82A3-91CDEB904C52}"/>
+              </a:ext>
+            </a:extLst>
+          </p:cNvPr>
+          <p:cNvPicPr>
+            <a:picLocks noChangeAspect="1"/>
+          </p:cNvPicPr>
+          <p:nvPr/>
+        </p:nvPicPr>
+        <p:blipFill>
+          <a:blip r:embed="rId3"/>
+          <a:stretch>
+            <a:fillRect/>
+          </a:stretch>
+        </p:blipFill>
+        <p:spPr>
+          <a:xfrm>
+            <a:off x="6093670" y="1888595"/>
+            <a:ext cx="6098330" cy="3545417"/>
           </a:xfrm>
           <a:prstGeom prst="rect">
             <a:avLst/>
@@ -6474,7 +6597,7 @@
     </p:spTree>
     <p:extLst>
       <p:ext uri="{BB962C8B-B14F-4D97-AF65-F5344CB8AC3E}">
-        <p14:creationId xmlns:p14="http://schemas.microsoft.com/office/powerpoint/2010/main" val="2449918465"/>
+        <p14:creationId xmlns:p14="http://schemas.microsoft.com/office/powerpoint/2010/main" val="211970903"/>
       </p:ext>
     </p:extLst>
   </p:cSld>
@@ -6506,7 +6629,7 @@
           <p:cNvPr id="2" name="Title 1">
             <a:extLst>
               <a:ext uri="{FF2B5EF4-FFF2-40B4-BE49-F238E27FC236}">
-                <a16:creationId xmlns:a16="http://schemas.microsoft.com/office/drawing/2014/main" id="{ED3DE8A9-4CA2-4EE2-98F7-EAA4E3C2B325}"/>
+                <a16:creationId xmlns:a16="http://schemas.microsoft.com/office/drawing/2014/main" id="{55DFD349-569F-4BA6-B1C1-4188FD2BFBEB}"/>
               </a:ext>
             </a:extLst>
           </p:cNvPr>
@@ -6524,7 +6647,7 @@
           <a:p>
             <a:r>
               <a:rPr lang="zh-CN" altLang="en-US" dirty="0"/>
-              <a:t>不同时长，加入各种休止</a:t>
+              <a:t>没有休止，加入不同时长</a:t>
             </a:r>
           </a:p>
         </p:txBody>
@@ -6534,7 +6657,7 @@
           <p:cNvPr id="3" name="Picture 2">
             <a:extLst>
               <a:ext uri="{FF2B5EF4-FFF2-40B4-BE49-F238E27FC236}">
-                <a16:creationId xmlns:a16="http://schemas.microsoft.com/office/drawing/2014/main" id="{E1E6140E-6FE6-47C3-B88A-FF6A36BD31F3}"/>
+                <a16:creationId xmlns:a16="http://schemas.microsoft.com/office/drawing/2014/main" id="{1C76CDEE-CF28-4269-8562-8D45C3009E77}"/>
               </a:ext>
             </a:extLst>
           </p:cNvPr>
@@ -6551,8 +6674,8 @@
         </p:blipFill>
         <p:spPr>
           <a:xfrm>
-            <a:off x="3437467" y="1967857"/>
-            <a:ext cx="8083020" cy="4442468"/>
+            <a:off x="828675" y="1866139"/>
+            <a:ext cx="8872008" cy="3888548"/>
           </a:xfrm>
           <a:prstGeom prst="rect">
             <a:avLst/>
@@ -6562,7 +6685,7 @@
     </p:spTree>
     <p:extLst>
       <p:ext uri="{BB962C8B-B14F-4D97-AF65-F5344CB8AC3E}">
-        <p14:creationId xmlns:p14="http://schemas.microsoft.com/office/powerpoint/2010/main" val="2153531935"/>
+        <p14:creationId xmlns:p14="http://schemas.microsoft.com/office/powerpoint/2010/main" val="2449918465"/>
       </p:ext>
     </p:extLst>
   </p:cSld>
@@ -6594,7 +6717,7 @@
           <p:cNvPr id="2" name="Title 1">
             <a:extLst>
               <a:ext uri="{FF2B5EF4-FFF2-40B4-BE49-F238E27FC236}">
-                <a16:creationId xmlns:a16="http://schemas.microsoft.com/office/drawing/2014/main" id="{A8A8A695-1045-45AC-A429-E00C98EBD5D2}"/>
+                <a16:creationId xmlns:a16="http://schemas.microsoft.com/office/drawing/2014/main" id="{ED3DE8A9-4CA2-4EE2-98F7-EAA4E3C2B325}"/>
               </a:ext>
             </a:extLst>
           </p:cNvPr>
@@ -6612,17 +6735,17 @@
           <a:p>
             <a:r>
               <a:rPr lang="zh-CN" altLang="en-US" dirty="0"/>
-              <a:t>每小节插入一个三连音，三连音不加休止</a:t>
+              <a:t>不同时长，加入各种休止</a:t>
             </a:r>
           </a:p>
         </p:txBody>
       </p:sp>
       <p:pic>
         <p:nvPicPr>
-          <p:cNvPr id="4" name="Picture 3">
-            <a:extLst>
-              <a:ext uri="{FF2B5EF4-FFF2-40B4-BE49-F238E27FC236}">
-                <a16:creationId xmlns:a16="http://schemas.microsoft.com/office/drawing/2014/main" id="{FFD67753-4F6A-4585-BFFC-9BA708557BB1}"/>
+          <p:cNvPr id="3" name="Picture 2">
+            <a:extLst>
+              <a:ext uri="{FF2B5EF4-FFF2-40B4-BE49-F238E27FC236}">
+                <a16:creationId xmlns:a16="http://schemas.microsoft.com/office/drawing/2014/main" id="{E1E6140E-6FE6-47C3-B88A-FF6A36BD31F3}"/>
               </a:ext>
             </a:extLst>
           </p:cNvPr>
@@ -6639,8 +6762,8 @@
         </p:blipFill>
         <p:spPr>
           <a:xfrm>
-            <a:off x="3860800" y="2158464"/>
-            <a:ext cx="7664450" cy="4356635"/>
+            <a:off x="3437467" y="1967857"/>
+            <a:ext cx="8083020" cy="4442468"/>
           </a:xfrm>
           <a:prstGeom prst="rect">
             <a:avLst/>
@@ -6650,7 +6773,7 @@
     </p:spTree>
     <p:extLst>
       <p:ext uri="{BB962C8B-B14F-4D97-AF65-F5344CB8AC3E}">
-        <p14:creationId xmlns:p14="http://schemas.microsoft.com/office/powerpoint/2010/main" val="4031901580"/>
+        <p14:creationId xmlns:p14="http://schemas.microsoft.com/office/powerpoint/2010/main" val="2153531935"/>
       </p:ext>
     </p:extLst>
   </p:cSld>
@@ -6682,7 +6805,7 @@
           <p:cNvPr id="2" name="Title 1">
             <a:extLst>
               <a:ext uri="{FF2B5EF4-FFF2-40B4-BE49-F238E27FC236}">
-                <a16:creationId xmlns:a16="http://schemas.microsoft.com/office/drawing/2014/main" id="{123E8ECC-49D8-4A59-BAD3-E62BE4490B26}"/>
+                <a16:creationId xmlns:a16="http://schemas.microsoft.com/office/drawing/2014/main" id="{A8A8A695-1045-45AC-A429-E00C98EBD5D2}"/>
               </a:ext>
             </a:extLst>
           </p:cNvPr>
@@ -6700,17 +6823,17 @@
           <a:p>
             <a:r>
               <a:rPr lang="zh-CN" altLang="en-US" dirty="0"/>
-              <a:t>上面的基础上，加入三连音休止</a:t>
+              <a:t>每小节插入一个三连音，三连音不加休止</a:t>
             </a:r>
           </a:p>
         </p:txBody>
       </p:sp>
       <p:pic>
         <p:nvPicPr>
-          <p:cNvPr id="3" name="Picture 2">
-            <a:extLst>
-              <a:ext uri="{FF2B5EF4-FFF2-40B4-BE49-F238E27FC236}">
-                <a16:creationId xmlns:a16="http://schemas.microsoft.com/office/drawing/2014/main" id="{EF6762B1-1DB4-42CC-8AF5-4A9B3CBBFE7D}"/>
+          <p:cNvPr id="4" name="Picture 3">
+            <a:extLst>
+              <a:ext uri="{FF2B5EF4-FFF2-40B4-BE49-F238E27FC236}">
+                <a16:creationId xmlns:a16="http://schemas.microsoft.com/office/drawing/2014/main" id="{FFD67753-4F6A-4585-BFFC-9BA708557BB1}"/>
               </a:ext>
             </a:extLst>
           </p:cNvPr>
@@ -6727,8 +6850,8 @@
         </p:blipFill>
         <p:spPr>
           <a:xfrm>
-            <a:off x="3129153" y="1769533"/>
-            <a:ext cx="8424672" cy="4712229"/>
+            <a:off x="3860800" y="2158464"/>
+            <a:ext cx="7664450" cy="4356635"/>
           </a:xfrm>
           <a:prstGeom prst="rect">
             <a:avLst/>
@@ -6738,7 +6861,7 @@
     </p:spTree>
     <p:extLst>
       <p:ext uri="{BB962C8B-B14F-4D97-AF65-F5344CB8AC3E}">
-        <p14:creationId xmlns:p14="http://schemas.microsoft.com/office/powerpoint/2010/main" val="1997386298"/>
+        <p14:creationId xmlns:p14="http://schemas.microsoft.com/office/powerpoint/2010/main" val="4031901580"/>
       </p:ext>
     </p:extLst>
   </p:cSld>

</xml_diff>